<commit_message>
minor edit, insert class diagram. finalize v0.1
</commit_message>
<xml_diff>
--- a/doc/classDiagram.pptx
+++ b/doc/classDiagram.pptx
@@ -3187,8 +3187,8 @@
         </p:nvSpPr>
         <p:spPr>
           <a:xfrm>
-            <a:off x="5905500" y="10226523"/>
-            <a:ext cx="1905000" cy="517677"/>
+            <a:off x="5529795" y="9868416"/>
+            <a:ext cx="2977067" cy="919073"/>
           </a:xfrm>
           <a:prstGeom prst="roundRect">
             <a:avLst/>
@@ -3225,15 +3225,14 @@
         <p:nvCxnSpPr>
           <p:cNvPr id="38" name="Straight Arrow Connector 37"/>
           <p:cNvCxnSpPr>
-            <a:stCxn id="4" idx="2"/>
             <a:endCxn id="10" idx="0"/>
           </p:cNvCxnSpPr>
           <p:nvPr/>
         </p:nvCxnSpPr>
         <p:spPr>
           <a:xfrm>
-            <a:off x="6826250" y="7414380"/>
-            <a:ext cx="31750" cy="2812143"/>
+            <a:off x="7018329" y="7414380"/>
+            <a:ext cx="0" cy="2454036"/>
           </a:xfrm>
           <a:prstGeom prst="straightConnector1">
             <a:avLst/>
@@ -3267,10 +3266,10 @@
         </p:nvGrpSpPr>
         <p:grpSpPr>
           <a:xfrm>
-            <a:off x="15495205" y="7329855"/>
-            <a:ext cx="16268698" cy="6906380"/>
-            <a:chOff x="266702" y="21287620"/>
-            <a:chExt cx="16268698" cy="6906380"/>
+            <a:off x="15495205" y="7571601"/>
+            <a:ext cx="16268698" cy="6664634"/>
+            <a:chOff x="266702" y="21529366"/>
+            <a:chExt cx="16268698" cy="6664634"/>
           </a:xfrm>
         </p:grpSpPr>
         <p:grpSp>
@@ -3281,10 +3280,10 @@
           </p:nvGrpSpPr>
           <p:grpSpPr>
             <a:xfrm>
-              <a:off x="508001" y="21287620"/>
-              <a:ext cx="16027399" cy="3048000"/>
-              <a:chOff x="508001" y="21287620"/>
-              <a:chExt cx="16027399" cy="3048000"/>
+              <a:off x="508001" y="21529366"/>
+              <a:ext cx="16027399" cy="2806254"/>
+              <a:chOff x="508001" y="21529366"/>
+              <a:chExt cx="16027399" cy="2806254"/>
             </a:xfrm>
           </p:grpSpPr>
           <p:sp>
@@ -3295,8 +3294,8 @@
             </p:nvSpPr>
             <p:spPr>
               <a:xfrm>
-                <a:off x="6969377" y="21287620"/>
-                <a:ext cx="2725893" cy="1211508"/>
+                <a:off x="6969378" y="21529366"/>
+                <a:ext cx="2262320" cy="969762"/>
               </a:xfrm>
               <a:prstGeom prst="roundRect">
                 <a:avLst/>
@@ -3322,7 +3321,7 @@
               <a:p>
                 <a:pPr algn="ctr"/>
                 <a:r>
-                  <a:rPr lang="en-US" sz="3600" dirty="0" smtClean="0"/>
+                  <a:rPr lang="en-US" sz="3200" dirty="0" smtClean="0"/>
                   <a:t>Token</a:t>
                 </a:r>
                 <a:endParaRPr lang="en-US" sz="3600" dirty="0"/>
@@ -3592,8 +3591,8 @@
             </p:nvCxnSpPr>
             <p:spPr>
               <a:xfrm rot="5400000" flipH="1" flipV="1">
-                <a:off x="3501916" y="20060488"/>
-                <a:ext cx="1634574" cy="5300347"/>
+                <a:off x="3562354" y="20120924"/>
+                <a:ext cx="1513701" cy="5300348"/>
               </a:xfrm>
               <a:prstGeom prst="bentConnector2">
                 <a:avLst/>
@@ -3692,8 +3691,8 @@
             </p:nvCxnSpPr>
             <p:spPr>
               <a:xfrm rot="16200000" flipV="1">
-                <a:off x="11670660" y="19917984"/>
-                <a:ext cx="1634574" cy="5585354"/>
+                <a:off x="11499311" y="19746635"/>
+                <a:ext cx="1513701" cy="6048926"/>
               </a:xfrm>
               <a:prstGeom prst="bentConnector2">
                 <a:avLst/>
@@ -4602,7 +4601,7 @@
         </p:nvSpPr>
         <p:spPr>
           <a:xfrm rot="10800000">
-            <a:off x="7344230" y="8807536"/>
+            <a:off x="7238092" y="7935752"/>
             <a:ext cx="186870" cy="245456"/>
           </a:xfrm>
           <a:prstGeom prst="triangle">
@@ -4642,8 +4641,8 @@
         </p:nvSpPr>
         <p:spPr>
           <a:xfrm>
-            <a:off x="6705600" y="7915870"/>
-            <a:ext cx="1485901" cy="923330"/>
+            <a:off x="6613524" y="7571601"/>
+            <a:ext cx="1485901" cy="646331"/>
           </a:xfrm>
           <a:prstGeom prst="rect">
             <a:avLst/>
@@ -4663,19 +4662,16 @@
                   <a:srgbClr val="C00000"/>
                 </a:solidFill>
               </a:rPr>
-              <a:t>Passes command </a:t>
-            </a:r>
+              <a:t>runs</a:t>
+            </a:r>
+            <a:endParaRPr lang="en-US" sz="1800" dirty="0" smtClean="0">
+              <a:solidFill>
+                <a:srgbClr val="C00000"/>
+              </a:solidFill>
+            </a:endParaRPr>
           </a:p>
           <a:p>
             <a:pPr algn="ctr"/>
-            <a:r>
-              <a:rPr lang="en-US" sz="1800" dirty="0" smtClean="0">
-                <a:solidFill>
-                  <a:srgbClr val="C00000"/>
-                </a:solidFill>
-              </a:rPr>
-              <a:t>to</a:t>
-            </a:r>
             <a:endParaRPr lang="en-US" sz="1800" dirty="0">
               <a:solidFill>
                 <a:srgbClr val="C00000"/>
@@ -4772,7 +4768,7 @@
         </p:nvGrpSpPr>
         <p:grpSpPr>
           <a:xfrm>
-            <a:off x="6923313" y="5257800"/>
+            <a:off x="6842125" y="5821574"/>
             <a:ext cx="1028701" cy="563773"/>
             <a:chOff x="6972299" y="8489219"/>
             <a:chExt cx="1028701" cy="563773"/>
@@ -4995,7 +4991,7 @@
         </p:nvSpPr>
         <p:spPr>
           <a:xfrm>
-            <a:off x="10515600" y="10226523"/>
+            <a:off x="11344658" y="9350739"/>
             <a:ext cx="2491425" cy="517677"/>
           </a:xfrm>
           <a:prstGeom prst="roundRect">
@@ -5029,62 +5025,387 @@
           </a:p>
         </p:txBody>
       </p:sp>
+      <p:sp>
+        <p:nvSpPr>
+          <p:cNvPr id="129" name="TextBox 128"/>
+          <p:cNvSpPr txBox="1"/>
+          <p:nvPr/>
+        </p:nvSpPr>
+        <p:spPr>
+          <a:xfrm>
+            <a:off x="12159344" y="3200400"/>
+            <a:ext cx="1788176" cy="369332"/>
+          </a:xfrm>
+          <a:prstGeom prst="rect">
+            <a:avLst/>
+          </a:prstGeom>
+          <a:noFill/>
+        </p:spPr>
+        <p:txBody>
+          <a:bodyPr wrap="square" rtlCol="0">
+            <a:spAutoFit/>
+          </a:bodyPr>
+          <a:lstStyle/>
+          <a:p>
+            <a:pPr algn="ctr"/>
+            <a:r>
+              <a:rPr lang="en-US" sz="1800" dirty="0" smtClean="0">
+                <a:solidFill>
+                  <a:srgbClr val="C00000"/>
+                </a:solidFill>
+              </a:rPr>
+              <a:t>Depends on</a:t>
+            </a:r>
+            <a:endParaRPr lang="en-US" sz="1800" dirty="0">
+              <a:solidFill>
+                <a:srgbClr val="C00000"/>
+              </a:solidFill>
+            </a:endParaRPr>
+          </a:p>
+        </p:txBody>
+      </p:sp>
+      <p:sp>
+        <p:nvSpPr>
+          <p:cNvPr id="136" name="TextBox 135"/>
+          <p:cNvSpPr txBox="1"/>
+          <p:nvPr/>
+        </p:nvSpPr>
+        <p:spPr>
+          <a:xfrm>
+            <a:off x="13125206" y="14419093"/>
+            <a:ext cx="1295400" cy="369332"/>
+          </a:xfrm>
+          <a:prstGeom prst="rect">
+            <a:avLst/>
+          </a:prstGeom>
+          <a:noFill/>
+        </p:spPr>
+        <p:txBody>
+          <a:bodyPr wrap="square" rtlCol="0">
+            <a:spAutoFit/>
+          </a:bodyPr>
+          <a:lstStyle/>
+          <a:p>
+            <a:r>
+              <a:rPr lang="en-US" sz="1800" dirty="0" smtClean="0">
+                <a:solidFill>
+                  <a:srgbClr val="C00000"/>
+                </a:solidFill>
+              </a:rPr>
+              <a:t>uses</a:t>
+            </a:r>
+            <a:endParaRPr lang="en-US" sz="1800" dirty="0">
+              <a:solidFill>
+                <a:srgbClr val="C00000"/>
+              </a:solidFill>
+            </a:endParaRPr>
+          </a:p>
+        </p:txBody>
+      </p:sp>
+      <p:sp>
+        <p:nvSpPr>
+          <p:cNvPr id="138" name="Isosceles Triangle 137"/>
+          <p:cNvSpPr/>
+          <p:nvPr/>
+        </p:nvSpPr>
+        <p:spPr>
+          <a:xfrm rot="10800000" flipV="1">
+            <a:off x="6399723" y="8630168"/>
+            <a:ext cx="186870" cy="245456"/>
+          </a:xfrm>
+          <a:prstGeom prst="triangle">
+            <a:avLst/>
+          </a:prstGeom>
+        </p:spPr>
+        <p:style>
+          <a:lnRef idx="2">
+            <a:schemeClr val="accent2">
+              <a:shade val="50000"/>
+            </a:schemeClr>
+          </a:lnRef>
+          <a:fillRef idx="1">
+            <a:schemeClr val="accent2"/>
+          </a:fillRef>
+          <a:effectRef idx="0">
+            <a:schemeClr val="accent2"/>
+          </a:effectRef>
+          <a:fontRef idx="minor">
+            <a:schemeClr val="lt1"/>
+          </a:fontRef>
+        </p:style>
+        <p:txBody>
+          <a:bodyPr rtlCol="0" anchor="ctr"/>
+          <a:lstStyle/>
+          <a:p>
+            <a:pPr algn="ctr"/>
+            <a:endParaRPr lang="en-US"/>
+          </a:p>
+        </p:txBody>
+      </p:sp>
+      <p:sp>
+        <p:nvSpPr>
+          <p:cNvPr id="139" name="TextBox 138"/>
+          <p:cNvSpPr txBox="1"/>
+          <p:nvPr/>
+        </p:nvSpPr>
+        <p:spPr>
+          <a:xfrm>
+            <a:off x="5759724" y="8884000"/>
+            <a:ext cx="1028701" cy="923330"/>
+          </a:xfrm>
+          <a:prstGeom prst="rect">
+            <a:avLst/>
+          </a:prstGeom>
+          <a:noFill/>
+        </p:spPr>
+        <p:txBody>
+          <a:bodyPr wrap="square" rtlCol="0">
+            <a:spAutoFit/>
+          </a:bodyPr>
+          <a:lstStyle/>
+          <a:p>
+            <a:pPr algn="ctr"/>
+            <a:r>
+              <a:rPr lang="en-US" sz="1800" dirty="0" smtClean="0">
+                <a:solidFill>
+                  <a:srgbClr val="C00000"/>
+                </a:solidFill>
+              </a:rPr>
+              <a:t>Returns string output</a:t>
+            </a:r>
+            <a:endParaRPr lang="en-US" sz="1800" dirty="0">
+              <a:solidFill>
+                <a:srgbClr val="C00000"/>
+              </a:solidFill>
+            </a:endParaRPr>
+          </a:p>
+        </p:txBody>
+      </p:sp>
+      <p:sp>
+        <p:nvSpPr>
+          <p:cNvPr id="141" name="Rounded Rectangle 140"/>
+          <p:cNvSpPr/>
+          <p:nvPr/>
+        </p:nvSpPr>
+        <p:spPr>
+          <a:xfrm>
+            <a:off x="3510010" y="14086082"/>
+            <a:ext cx="3002146" cy="517677"/>
+          </a:xfrm>
+          <a:prstGeom prst="roundRect">
+            <a:avLst/>
+          </a:prstGeom>
+        </p:spPr>
+        <p:style>
+          <a:lnRef idx="1">
+            <a:schemeClr val="accent5"/>
+          </a:lnRef>
+          <a:fillRef idx="2">
+            <a:schemeClr val="accent5"/>
+          </a:fillRef>
+          <a:effectRef idx="1">
+            <a:schemeClr val="accent5"/>
+          </a:effectRef>
+          <a:fontRef idx="minor">
+            <a:schemeClr val="dk1"/>
+          </a:fontRef>
+        </p:style>
+        <p:txBody>
+          <a:bodyPr lIns="522481" tIns="261241" rIns="522481" bIns="261241" spcCol="0" rtlCol="0" anchor="ctr"/>
+          <a:lstStyle/>
+          <a:p>
+            <a:pPr algn="ctr"/>
+            <a:r>
+              <a:rPr lang="en-US" sz="2000" dirty="0" err="1" smtClean="0"/>
+              <a:t>OperationHandler</a:t>
+            </a:r>
+            <a:endParaRPr lang="en-US" sz="2000" dirty="0"/>
+          </a:p>
+        </p:txBody>
+      </p:sp>
+      <p:sp>
+        <p:nvSpPr>
+          <p:cNvPr id="166" name="Rounded Rectangle 165"/>
+          <p:cNvSpPr/>
+          <p:nvPr/>
+        </p:nvSpPr>
+        <p:spPr>
+          <a:xfrm>
+            <a:off x="3620154" y="16443494"/>
+            <a:ext cx="2861656" cy="517677"/>
+          </a:xfrm>
+          <a:prstGeom prst="roundRect">
+            <a:avLst/>
+          </a:prstGeom>
+        </p:spPr>
+        <p:style>
+          <a:lnRef idx="1">
+            <a:schemeClr val="accent5"/>
+          </a:lnRef>
+          <a:fillRef idx="2">
+            <a:schemeClr val="accent5"/>
+          </a:fillRef>
+          <a:effectRef idx="1">
+            <a:schemeClr val="accent5"/>
+          </a:effectRef>
+          <a:fontRef idx="minor">
+            <a:schemeClr val="dk1"/>
+          </a:fontRef>
+        </p:style>
+        <p:txBody>
+          <a:bodyPr lIns="522481" tIns="261241" rIns="522481" bIns="261241" spcCol="0" rtlCol="0" anchor="ctr"/>
+          <a:lstStyle/>
+          <a:p>
+            <a:pPr algn="ctr"/>
+            <a:r>
+              <a:rPr lang="en-US" sz="2000" dirty="0" smtClean="0"/>
+              <a:t>Storage</a:t>
+            </a:r>
+            <a:endParaRPr lang="en-US" sz="2000" dirty="0"/>
+          </a:p>
+        </p:txBody>
+      </p:sp>
+      <p:sp>
+        <p:nvSpPr>
+          <p:cNvPr id="182" name="Rounded Rectangle 181"/>
+          <p:cNvSpPr/>
+          <p:nvPr/>
+        </p:nvSpPr>
+        <p:spPr>
+          <a:xfrm>
+            <a:off x="10320944" y="14171562"/>
+            <a:ext cx="2861656" cy="517677"/>
+          </a:xfrm>
+          <a:prstGeom prst="roundRect">
+            <a:avLst/>
+          </a:prstGeom>
+        </p:spPr>
+        <p:style>
+          <a:lnRef idx="1">
+            <a:schemeClr val="accent5"/>
+          </a:lnRef>
+          <a:fillRef idx="2">
+            <a:schemeClr val="accent5"/>
+          </a:fillRef>
+          <a:effectRef idx="1">
+            <a:schemeClr val="accent5"/>
+          </a:effectRef>
+          <a:fontRef idx="minor">
+            <a:schemeClr val="dk1"/>
+          </a:fontRef>
+        </p:style>
+        <p:txBody>
+          <a:bodyPr lIns="522481" tIns="261241" rIns="522481" bIns="261241" spcCol="0" rtlCol="0" anchor="ctr"/>
+          <a:lstStyle/>
+          <a:p>
+            <a:pPr algn="ctr"/>
+            <a:r>
+              <a:rPr lang="en-US" sz="2000" dirty="0" err="1" smtClean="0"/>
+              <a:t>CommandParser</a:t>
+            </a:r>
+            <a:endParaRPr lang="en-US" sz="2000" dirty="0"/>
+          </a:p>
+        </p:txBody>
+      </p:sp>
+      <p:sp>
+        <p:nvSpPr>
+          <p:cNvPr id="183" name="TextBox 182"/>
+          <p:cNvSpPr txBox="1"/>
+          <p:nvPr/>
+        </p:nvSpPr>
+        <p:spPr>
+          <a:xfrm>
+            <a:off x="4195810" y="16973571"/>
+            <a:ext cx="2203913" cy="338554"/>
+          </a:xfrm>
+          <a:prstGeom prst="rect">
+            <a:avLst/>
+          </a:prstGeom>
+          <a:noFill/>
+        </p:spPr>
+        <p:txBody>
+          <a:bodyPr wrap="square" rtlCol="0">
+            <a:spAutoFit/>
+          </a:bodyPr>
+          <a:lstStyle/>
+          <a:p>
+            <a:r>
+              <a:rPr lang="en-US" sz="1600" dirty="0" smtClean="0">
+                <a:solidFill>
+                  <a:srgbClr val="00B050"/>
+                </a:solidFill>
+              </a:rPr>
+              <a:t>XML Parser here</a:t>
+            </a:r>
+            <a:endParaRPr lang="en-US" sz="1600" dirty="0">
+              <a:solidFill>
+                <a:srgbClr val="00B050"/>
+              </a:solidFill>
+            </a:endParaRPr>
+          </a:p>
+        </p:txBody>
+      </p:sp>
+      <p:sp>
+        <p:nvSpPr>
+          <p:cNvPr id="184" name="Rounded Rectangle 183"/>
+          <p:cNvSpPr/>
+          <p:nvPr/>
+        </p:nvSpPr>
+        <p:spPr>
+          <a:xfrm>
+            <a:off x="10324450" y="16073236"/>
+            <a:ext cx="2861656" cy="517677"/>
+          </a:xfrm>
+          <a:prstGeom prst="roundRect">
+            <a:avLst/>
+          </a:prstGeom>
+        </p:spPr>
+        <p:style>
+          <a:lnRef idx="1">
+            <a:schemeClr val="accent5"/>
+          </a:lnRef>
+          <a:fillRef idx="2">
+            <a:schemeClr val="accent5"/>
+          </a:fillRef>
+          <a:effectRef idx="1">
+            <a:schemeClr val="accent5"/>
+          </a:effectRef>
+          <a:fontRef idx="minor">
+            <a:schemeClr val="dk1"/>
+          </a:fontRef>
+        </p:style>
+        <p:txBody>
+          <a:bodyPr lIns="522481" tIns="261241" rIns="522481" bIns="261241" spcCol="0" rtlCol="0" anchor="ctr"/>
+          <a:lstStyle/>
+          <a:p>
+            <a:pPr algn="ctr"/>
+            <a:r>
+              <a:rPr lang="en-US" sz="2000" dirty="0" smtClean="0"/>
+              <a:t>Operation</a:t>
+            </a:r>
+            <a:endParaRPr lang="en-US" sz="2000" dirty="0"/>
+          </a:p>
+        </p:txBody>
+      </p:sp>
       <p:cxnSp>
         <p:nvCxnSpPr>
-          <p:cNvPr id="121" name="Straight Arrow Connector 120"/>
+          <p:cNvPr id="186" name="Straight Arrow Connector 185"/>
           <p:cNvCxnSpPr>
-            <a:stCxn id="3" idx="2"/>
-            <a:endCxn id="120" idx="0"/>
+            <a:stCxn id="141" idx="2"/>
+            <a:endCxn id="166" idx="0"/>
           </p:cNvCxnSpPr>
           <p:nvPr/>
         </p:nvCxnSpPr>
         <p:spPr>
           <a:xfrm>
-            <a:off x="11739237" y="7326690"/>
-            <a:ext cx="22076" cy="2899833"/>
+            <a:off x="5011083" y="14603759"/>
+            <a:ext cx="39899" cy="1839735"/>
           </a:xfrm>
           <a:prstGeom prst="straightConnector1">
             <a:avLst/>
           </a:prstGeom>
           <a:ln w="38100">
             <a:prstDash val="solid"/>
-            <a:tailEnd type="arrow"/>
-          </a:ln>
-        </p:spPr>
-        <p:style>
-          <a:lnRef idx="1">
-            <a:schemeClr val="accent1"/>
-          </a:lnRef>
-          <a:fillRef idx="0">
-            <a:schemeClr val="accent1"/>
-          </a:fillRef>
-          <a:effectRef idx="0">
-            <a:schemeClr val="accent1"/>
-          </a:effectRef>
-          <a:fontRef idx="minor">
-            <a:schemeClr val="tx1"/>
-          </a:fontRef>
-        </p:style>
-      </p:cxnSp>
-      <p:cxnSp>
-        <p:nvCxnSpPr>
-          <p:cNvPr id="124" name="Straight Arrow Connector 123"/>
-          <p:cNvCxnSpPr>
-            <a:stCxn id="10" idx="3"/>
-            <a:endCxn id="120" idx="1"/>
-          </p:cNvCxnSpPr>
-          <p:nvPr/>
-        </p:nvCxnSpPr>
-        <p:spPr>
-          <a:xfrm>
-            <a:off x="7810500" y="10485362"/>
-            <a:ext cx="2705100" cy="0"/>
-          </a:xfrm>
-          <a:prstGeom prst="straightConnector1">
-            <a:avLst/>
-          </a:prstGeom>
-          <a:ln w="38100">
-            <a:prstDash val="sysDot"/>
             <a:tailEnd type="arrow"/>
           </a:ln>
         </p:spPr>
@@ -5105,741 +5426,28 @@
       </p:cxnSp>
       <p:grpSp>
         <p:nvGrpSpPr>
-          <p:cNvPr id="131" name="Group 130"/>
+          <p:cNvPr id="219" name="Group 218"/>
           <p:cNvGrpSpPr/>
           <p:nvPr/>
         </p:nvGrpSpPr>
         <p:grpSpPr>
           <a:xfrm>
-            <a:off x="11734800" y="8296870"/>
-            <a:ext cx="1788176" cy="1151929"/>
-            <a:chOff x="11734800" y="8296870"/>
-            <a:chExt cx="1788176" cy="1151929"/>
+            <a:off x="7315200" y="11675049"/>
+            <a:ext cx="1469728" cy="923330"/>
+            <a:chOff x="8843389" y="10124937"/>
+            <a:chExt cx="1469728" cy="1027640"/>
           </a:xfrm>
         </p:grpSpPr>
         <p:sp>
           <p:nvSpPr>
-            <p:cNvPr id="128" name="Isosceles Triangle 127"/>
-            <p:cNvSpPr/>
-            <p:nvPr/>
-          </p:nvSpPr>
-          <p:spPr>
-            <a:xfrm rot="10800000">
-              <a:off x="12538530" y="9203343"/>
-              <a:ext cx="186870" cy="245456"/>
-            </a:xfrm>
-            <a:prstGeom prst="triangle">
-              <a:avLst/>
-            </a:prstGeom>
-          </p:spPr>
-          <p:style>
-            <a:lnRef idx="2">
-              <a:schemeClr val="accent2">
-                <a:shade val="50000"/>
-              </a:schemeClr>
-            </a:lnRef>
-            <a:fillRef idx="1">
-              <a:schemeClr val="accent2"/>
-            </a:fillRef>
-            <a:effectRef idx="0">
-              <a:schemeClr val="accent2"/>
-            </a:effectRef>
-            <a:fontRef idx="minor">
-              <a:schemeClr val="lt1"/>
-            </a:fontRef>
-          </p:style>
-          <p:txBody>
-            <a:bodyPr rtlCol="0" anchor="ctr"/>
-            <a:lstStyle/>
-            <a:p>
-              <a:pPr algn="ctr"/>
-              <a:endParaRPr lang="en-US"/>
-            </a:p>
-          </p:txBody>
-        </p:sp>
-        <p:sp>
-          <p:nvSpPr>
-            <p:cNvPr id="129" name="TextBox 128"/>
+            <p:cNvPr id="193" name="TextBox 192"/>
             <p:cNvSpPr txBox="1"/>
             <p:nvPr/>
           </p:nvSpPr>
           <p:spPr>
             <a:xfrm>
-              <a:off x="11734800" y="8296870"/>
-              <a:ext cx="1788176" cy="923330"/>
-            </a:xfrm>
-            <a:prstGeom prst="rect">
-              <a:avLst/>
-            </a:prstGeom>
-            <a:noFill/>
-          </p:spPr>
-          <p:txBody>
-            <a:bodyPr wrap="square" rtlCol="0">
-              <a:spAutoFit/>
-            </a:bodyPr>
-            <a:lstStyle/>
-            <a:p>
-              <a:pPr algn="ctr"/>
-              <a:r>
-                <a:rPr lang="en-US" sz="1800" dirty="0" smtClean="0">
-                  <a:solidFill>
-                    <a:srgbClr val="C00000"/>
-                  </a:solidFill>
-                </a:rPr>
-                <a:t>Adds </a:t>
-              </a:r>
-              <a:r>
-                <a:rPr lang="en-US" sz="1800" dirty="0" err="1" smtClean="0">
-                  <a:solidFill>
-                    <a:srgbClr val="C00000"/>
-                  </a:solidFill>
-                </a:rPr>
-                <a:t>FlexiCommands</a:t>
-              </a:r>
-              <a:r>
-                <a:rPr lang="en-US" sz="1800" dirty="0" smtClean="0">
-                  <a:solidFill>
-                    <a:srgbClr val="C00000"/>
-                  </a:solidFill>
-                </a:rPr>
-                <a:t>  to</a:t>
-              </a:r>
-              <a:endParaRPr lang="en-US" sz="1800" dirty="0">
-                <a:solidFill>
-                  <a:srgbClr val="C00000"/>
-                </a:solidFill>
-              </a:endParaRPr>
-            </a:p>
-          </p:txBody>
-        </p:sp>
-      </p:grpSp>
-      <p:sp>
-        <p:nvSpPr>
-          <p:cNvPr id="135" name="Isosceles Triangle 134"/>
-          <p:cNvSpPr/>
-          <p:nvPr/>
-        </p:nvSpPr>
-        <p:spPr>
-          <a:xfrm rot="5400000">
-            <a:off x="9447624" y="10148617"/>
-            <a:ext cx="186870" cy="245456"/>
-          </a:xfrm>
-          <a:prstGeom prst="triangle">
-            <a:avLst/>
-          </a:prstGeom>
-        </p:spPr>
-        <p:style>
-          <a:lnRef idx="2">
-            <a:schemeClr val="accent2">
-              <a:shade val="50000"/>
-            </a:schemeClr>
-          </a:lnRef>
-          <a:fillRef idx="1">
-            <a:schemeClr val="accent2"/>
-          </a:fillRef>
-          <a:effectRef idx="0">
-            <a:schemeClr val="accent2"/>
-          </a:effectRef>
-          <a:fontRef idx="minor">
-            <a:schemeClr val="lt1"/>
-          </a:fontRef>
-        </p:style>
-        <p:txBody>
-          <a:bodyPr rtlCol="0" anchor="ctr"/>
-          <a:lstStyle/>
-          <a:p>
-            <a:pPr algn="ctr"/>
-            <a:endParaRPr lang="en-US"/>
-          </a:p>
-        </p:txBody>
-      </p:sp>
-      <p:sp>
-        <p:nvSpPr>
-          <p:cNvPr id="136" name="TextBox 135"/>
-          <p:cNvSpPr txBox="1"/>
-          <p:nvPr/>
-        </p:nvSpPr>
-        <p:spPr>
-          <a:xfrm>
-            <a:off x="8763000" y="10070068"/>
-            <a:ext cx="1295400" cy="369332"/>
-          </a:xfrm>
-          <a:prstGeom prst="rect">
-            <a:avLst/>
-          </a:prstGeom>
-          <a:noFill/>
-        </p:spPr>
-        <p:txBody>
-          <a:bodyPr wrap="square" rtlCol="0">
-            <a:spAutoFit/>
-          </a:bodyPr>
-          <a:lstStyle/>
-          <a:p>
-            <a:r>
-              <a:rPr lang="en-US" sz="1800" dirty="0" smtClean="0">
-                <a:solidFill>
-                  <a:srgbClr val="C00000"/>
-                </a:solidFill>
-              </a:rPr>
-              <a:t>uses</a:t>
-            </a:r>
-            <a:endParaRPr lang="en-US" sz="1800" dirty="0">
-              <a:solidFill>
-                <a:srgbClr val="C00000"/>
-              </a:solidFill>
-            </a:endParaRPr>
-          </a:p>
-        </p:txBody>
-      </p:sp>
-      <p:sp>
-        <p:nvSpPr>
-          <p:cNvPr id="138" name="Isosceles Triangle 137"/>
-          <p:cNvSpPr/>
-          <p:nvPr/>
-        </p:nvSpPr>
-        <p:spPr>
-          <a:xfrm rot="10800000" flipV="1">
-            <a:off x="6169480" y="8813036"/>
-            <a:ext cx="186870" cy="245456"/>
-          </a:xfrm>
-          <a:prstGeom prst="triangle">
-            <a:avLst/>
-          </a:prstGeom>
-        </p:spPr>
-        <p:style>
-          <a:lnRef idx="2">
-            <a:schemeClr val="accent2">
-              <a:shade val="50000"/>
-            </a:schemeClr>
-          </a:lnRef>
-          <a:fillRef idx="1">
-            <a:schemeClr val="accent2"/>
-          </a:fillRef>
-          <a:effectRef idx="0">
-            <a:schemeClr val="accent2"/>
-          </a:effectRef>
-          <a:fontRef idx="minor">
-            <a:schemeClr val="lt1"/>
-          </a:fontRef>
-        </p:style>
-        <p:txBody>
-          <a:bodyPr rtlCol="0" anchor="ctr"/>
-          <a:lstStyle/>
-          <a:p>
-            <a:pPr algn="ctr"/>
-            <a:endParaRPr lang="en-US"/>
-          </a:p>
-        </p:txBody>
-      </p:sp>
-      <p:sp>
-        <p:nvSpPr>
-          <p:cNvPr id="139" name="TextBox 138"/>
-          <p:cNvSpPr txBox="1"/>
-          <p:nvPr/>
-        </p:nvSpPr>
-        <p:spPr>
-          <a:xfrm>
-            <a:off x="5797549" y="9058870"/>
-            <a:ext cx="1028701" cy="923330"/>
-          </a:xfrm>
-          <a:prstGeom prst="rect">
-            <a:avLst/>
-          </a:prstGeom>
-          <a:noFill/>
-        </p:spPr>
-        <p:txBody>
-          <a:bodyPr wrap="square" rtlCol="0">
-            <a:spAutoFit/>
-          </a:bodyPr>
-          <a:lstStyle/>
-          <a:p>
-            <a:pPr algn="ctr"/>
-            <a:r>
-              <a:rPr lang="en-US" sz="1800" dirty="0" smtClean="0">
-                <a:solidFill>
-                  <a:srgbClr val="C00000"/>
-                </a:solidFill>
-              </a:rPr>
-              <a:t>Returns output to</a:t>
-            </a:r>
-            <a:endParaRPr lang="en-US" sz="1800" dirty="0">
-              <a:solidFill>
-                <a:srgbClr val="C00000"/>
-              </a:solidFill>
-            </a:endParaRPr>
-          </a:p>
-        </p:txBody>
-      </p:sp>
-      <p:sp>
-        <p:nvSpPr>
-          <p:cNvPr id="140" name="Rounded Rectangle 139"/>
-          <p:cNvSpPr/>
-          <p:nvPr/>
-        </p:nvSpPr>
-        <p:spPr>
-          <a:xfrm>
-            <a:off x="1752600" y="12641338"/>
-            <a:ext cx="2462597" cy="517677"/>
-          </a:xfrm>
-          <a:prstGeom prst="roundRect">
-            <a:avLst/>
-          </a:prstGeom>
-        </p:spPr>
-        <p:style>
-          <a:lnRef idx="1">
-            <a:schemeClr val="accent5"/>
-          </a:lnRef>
-          <a:fillRef idx="2">
-            <a:schemeClr val="accent5"/>
-          </a:fillRef>
-          <a:effectRef idx="1">
-            <a:schemeClr val="accent5"/>
-          </a:effectRef>
-          <a:fontRef idx="minor">
-            <a:schemeClr val="dk1"/>
-          </a:fontRef>
-        </p:style>
-        <p:txBody>
-          <a:bodyPr lIns="522481" tIns="261241" rIns="522481" bIns="261241" spcCol="0" rtlCol="0" anchor="ctr"/>
-          <a:lstStyle/>
-          <a:p>
-            <a:pPr algn="ctr"/>
-            <a:r>
-              <a:rPr lang="en-US" sz="2000" dirty="0" err="1" smtClean="0"/>
-              <a:t>List:TaskList</a:t>
-            </a:r>
-            <a:endParaRPr lang="en-US" sz="2000" dirty="0"/>
-          </a:p>
-        </p:txBody>
-      </p:sp>
-      <p:sp>
-        <p:nvSpPr>
-          <p:cNvPr id="141" name="Rounded Rectangle 140"/>
-          <p:cNvSpPr/>
-          <p:nvPr/>
-        </p:nvSpPr>
-        <p:spPr>
-          <a:xfrm>
-            <a:off x="4724400" y="14171562"/>
-            <a:ext cx="3002146" cy="517677"/>
-          </a:xfrm>
-          <a:prstGeom prst="roundRect">
-            <a:avLst/>
-          </a:prstGeom>
-        </p:spPr>
-        <p:style>
-          <a:lnRef idx="1">
-            <a:schemeClr val="accent5"/>
-          </a:lnRef>
-          <a:fillRef idx="2">
-            <a:schemeClr val="accent5"/>
-          </a:fillRef>
-          <a:effectRef idx="1">
-            <a:schemeClr val="accent5"/>
-          </a:effectRef>
-          <a:fontRef idx="minor">
-            <a:schemeClr val="dk1"/>
-          </a:fontRef>
-        </p:style>
-        <p:txBody>
-          <a:bodyPr lIns="522481" tIns="261241" rIns="522481" bIns="261241" spcCol="0" rtlCol="0" anchor="ctr"/>
-          <a:lstStyle/>
-          <a:p>
-            <a:pPr algn="ctr"/>
-            <a:r>
-              <a:rPr lang="en-US" sz="2000" dirty="0" err="1" smtClean="0"/>
-              <a:t>OperationHandler</a:t>
-            </a:r>
-            <a:endParaRPr lang="en-US" sz="2000" dirty="0"/>
-          </a:p>
-        </p:txBody>
-      </p:sp>
-      <p:cxnSp>
-        <p:nvCxnSpPr>
-          <p:cNvPr id="155" name="Elbow Connector 154"/>
-          <p:cNvCxnSpPr>
-            <a:stCxn id="10" idx="1"/>
-            <a:endCxn id="140" idx="0"/>
-          </p:cNvCxnSpPr>
-          <p:nvPr/>
-        </p:nvCxnSpPr>
-        <p:spPr>
-          <a:xfrm rot="10800000" flipV="1">
-            <a:off x="2983900" y="10485362"/>
-            <a:ext cx="2921601" cy="2155976"/>
-          </a:xfrm>
-          <a:prstGeom prst="bentConnector2">
-            <a:avLst/>
-          </a:prstGeom>
-          <a:ln w="38100">
-            <a:prstDash val="solid"/>
-            <a:tailEnd type="arrow"/>
-          </a:ln>
-        </p:spPr>
-        <p:style>
-          <a:lnRef idx="1">
-            <a:schemeClr val="accent1"/>
-          </a:lnRef>
-          <a:fillRef idx="0">
-            <a:schemeClr val="accent1"/>
-          </a:fillRef>
-          <a:effectRef idx="0">
-            <a:schemeClr val="accent1"/>
-          </a:effectRef>
-          <a:fontRef idx="minor">
-            <a:schemeClr val="tx1"/>
-          </a:fontRef>
-        </p:style>
-      </p:cxnSp>
-      <p:sp>
-        <p:nvSpPr>
-          <p:cNvPr id="160" name="TextBox 159"/>
-          <p:cNvSpPr txBox="1"/>
-          <p:nvPr/>
-        </p:nvSpPr>
-        <p:spPr>
-          <a:xfrm>
-            <a:off x="3048000" y="12049780"/>
-            <a:ext cx="398781" cy="523220"/>
-          </a:xfrm>
-          <a:prstGeom prst="rect">
-            <a:avLst/>
-          </a:prstGeom>
-          <a:noFill/>
-        </p:spPr>
-        <p:txBody>
-          <a:bodyPr wrap="square" rtlCol="0">
-            <a:spAutoFit/>
-          </a:bodyPr>
-          <a:lstStyle/>
-          <a:p>
-            <a:r>
-              <a:rPr lang="en-US" sz="2800" dirty="0" smtClean="0">
-                <a:solidFill>
-                  <a:schemeClr val="tx2"/>
-                </a:solidFill>
-              </a:rPr>
-              <a:t>1</a:t>
-            </a:r>
-            <a:endParaRPr lang="en-US" sz="2800" dirty="0">
-              <a:solidFill>
-                <a:schemeClr val="tx2"/>
-              </a:solidFill>
-            </a:endParaRPr>
-          </a:p>
-        </p:txBody>
-      </p:sp>
-      <p:sp>
-        <p:nvSpPr>
-          <p:cNvPr id="161" name="TextBox 160"/>
-          <p:cNvSpPr txBox="1"/>
-          <p:nvPr/>
-        </p:nvSpPr>
-        <p:spPr>
-          <a:xfrm>
-            <a:off x="2057400" y="13106400"/>
-            <a:ext cx="2203913" cy="338554"/>
-          </a:xfrm>
-          <a:prstGeom prst="rect">
-            <a:avLst/>
-          </a:prstGeom>
-          <a:noFill/>
-        </p:spPr>
-        <p:txBody>
-          <a:bodyPr wrap="square" rtlCol="0">
-            <a:spAutoFit/>
-          </a:bodyPr>
-          <a:lstStyle/>
-          <a:p>
-            <a:r>
-              <a:rPr lang="en-US" sz="1600" dirty="0">
-                <a:solidFill>
-                  <a:srgbClr val="00B050"/>
-                </a:solidFill>
-              </a:rPr>
-              <a:t>m</a:t>
-            </a:r>
-            <a:r>
-              <a:rPr lang="en-US" sz="1600" dirty="0" smtClean="0">
-                <a:solidFill>
-                  <a:srgbClr val="00B050"/>
-                </a:solidFill>
-              </a:rPr>
-              <a:t>ain data structure</a:t>
-            </a:r>
-            <a:endParaRPr lang="en-US" sz="1600" dirty="0">
-              <a:solidFill>
-                <a:srgbClr val="00B050"/>
-              </a:solidFill>
-            </a:endParaRPr>
-          </a:p>
-        </p:txBody>
-      </p:sp>
-      <p:sp>
-        <p:nvSpPr>
-          <p:cNvPr id="166" name="Rounded Rectangle 165"/>
-          <p:cNvSpPr/>
-          <p:nvPr/>
-        </p:nvSpPr>
-        <p:spPr>
-          <a:xfrm>
-            <a:off x="4834544" y="16528974"/>
-            <a:ext cx="2861656" cy="517677"/>
-          </a:xfrm>
-          <a:prstGeom prst="roundRect">
-            <a:avLst/>
-          </a:prstGeom>
-        </p:spPr>
-        <p:style>
-          <a:lnRef idx="1">
-            <a:schemeClr val="accent5"/>
-          </a:lnRef>
-          <a:fillRef idx="2">
-            <a:schemeClr val="accent5"/>
-          </a:fillRef>
-          <a:effectRef idx="1">
-            <a:schemeClr val="accent5"/>
-          </a:effectRef>
-          <a:fontRef idx="minor">
-            <a:schemeClr val="dk1"/>
-          </a:fontRef>
-        </p:style>
-        <p:txBody>
-          <a:bodyPr lIns="522481" tIns="261241" rIns="522481" bIns="261241" spcCol="0" rtlCol="0" anchor="ctr"/>
-          <a:lstStyle/>
-          <a:p>
-            <a:pPr algn="ctr"/>
-            <a:r>
-              <a:rPr lang="en-US" sz="2000" dirty="0" smtClean="0"/>
-              <a:t>Storage</a:t>
-            </a:r>
-            <a:endParaRPr lang="en-US" sz="2000" dirty="0"/>
-          </a:p>
-        </p:txBody>
-      </p:sp>
-      <p:sp>
-        <p:nvSpPr>
-          <p:cNvPr id="182" name="Rounded Rectangle 181"/>
-          <p:cNvSpPr/>
-          <p:nvPr/>
-        </p:nvSpPr>
-        <p:spPr>
-          <a:xfrm>
-            <a:off x="10320944" y="14171562"/>
-            <a:ext cx="2861656" cy="517677"/>
-          </a:xfrm>
-          <a:prstGeom prst="roundRect">
-            <a:avLst/>
-          </a:prstGeom>
-        </p:spPr>
-        <p:style>
-          <a:lnRef idx="1">
-            <a:schemeClr val="accent5"/>
-          </a:lnRef>
-          <a:fillRef idx="2">
-            <a:schemeClr val="accent5"/>
-          </a:fillRef>
-          <a:effectRef idx="1">
-            <a:schemeClr val="accent5"/>
-          </a:effectRef>
-          <a:fontRef idx="minor">
-            <a:schemeClr val="dk1"/>
-          </a:fontRef>
-        </p:style>
-        <p:txBody>
-          <a:bodyPr lIns="522481" tIns="261241" rIns="522481" bIns="261241" spcCol="0" rtlCol="0" anchor="ctr"/>
-          <a:lstStyle/>
-          <a:p>
-            <a:pPr algn="ctr"/>
-            <a:r>
-              <a:rPr lang="en-US" sz="2000" dirty="0" err="1" smtClean="0"/>
-              <a:t>CommandParser</a:t>
-            </a:r>
-            <a:endParaRPr lang="en-US" sz="2000" dirty="0"/>
-          </a:p>
-        </p:txBody>
-      </p:sp>
-      <p:sp>
-        <p:nvSpPr>
-          <p:cNvPr id="183" name="TextBox 182"/>
-          <p:cNvSpPr txBox="1"/>
-          <p:nvPr/>
-        </p:nvSpPr>
-        <p:spPr>
-          <a:xfrm>
-            <a:off x="5410200" y="17059051"/>
-            <a:ext cx="2203913" cy="338554"/>
-          </a:xfrm>
-          <a:prstGeom prst="rect">
-            <a:avLst/>
-          </a:prstGeom>
-          <a:noFill/>
-        </p:spPr>
-        <p:txBody>
-          <a:bodyPr wrap="square" rtlCol="0">
-            <a:spAutoFit/>
-          </a:bodyPr>
-          <a:lstStyle/>
-          <a:p>
-            <a:r>
-              <a:rPr lang="en-US" sz="1600" dirty="0" smtClean="0">
-                <a:solidFill>
-                  <a:srgbClr val="00B050"/>
-                </a:solidFill>
-              </a:rPr>
-              <a:t>XML Parser here</a:t>
-            </a:r>
-            <a:endParaRPr lang="en-US" sz="1600" dirty="0">
-              <a:solidFill>
-                <a:srgbClr val="00B050"/>
-              </a:solidFill>
-            </a:endParaRPr>
-          </a:p>
-        </p:txBody>
-      </p:sp>
-      <p:sp>
-        <p:nvSpPr>
-          <p:cNvPr id="184" name="Rounded Rectangle 183"/>
-          <p:cNvSpPr/>
-          <p:nvPr/>
-        </p:nvSpPr>
-        <p:spPr>
-          <a:xfrm>
-            <a:off x="10324450" y="16073236"/>
-            <a:ext cx="2861656" cy="517677"/>
-          </a:xfrm>
-          <a:prstGeom prst="roundRect">
-            <a:avLst/>
-          </a:prstGeom>
-        </p:spPr>
-        <p:style>
-          <a:lnRef idx="1">
-            <a:schemeClr val="accent5"/>
-          </a:lnRef>
-          <a:fillRef idx="2">
-            <a:schemeClr val="accent5"/>
-          </a:fillRef>
-          <a:effectRef idx="1">
-            <a:schemeClr val="accent5"/>
-          </a:effectRef>
-          <a:fontRef idx="minor">
-            <a:schemeClr val="dk1"/>
-          </a:fontRef>
-        </p:style>
-        <p:txBody>
-          <a:bodyPr lIns="522481" tIns="261241" rIns="522481" bIns="261241" spcCol="0" rtlCol="0" anchor="ctr"/>
-          <a:lstStyle/>
-          <a:p>
-            <a:pPr algn="ctr"/>
-            <a:r>
-              <a:rPr lang="en-US" sz="2000" dirty="0" smtClean="0"/>
-              <a:t>Operation</a:t>
-            </a:r>
-            <a:endParaRPr lang="en-US" sz="2000" dirty="0"/>
-          </a:p>
-        </p:txBody>
-      </p:sp>
-      <p:cxnSp>
-        <p:nvCxnSpPr>
-          <p:cNvPr id="186" name="Straight Arrow Connector 185"/>
-          <p:cNvCxnSpPr>
-            <a:stCxn id="141" idx="2"/>
-            <a:endCxn id="166" idx="0"/>
-          </p:cNvCxnSpPr>
-          <p:nvPr/>
-        </p:nvCxnSpPr>
-        <p:spPr>
-          <a:xfrm>
-            <a:off x="6225473" y="14689239"/>
-            <a:ext cx="39899" cy="1839735"/>
-          </a:xfrm>
-          <a:prstGeom prst="straightConnector1">
-            <a:avLst/>
-          </a:prstGeom>
-          <a:ln w="38100">
-            <a:prstDash val="solid"/>
-            <a:tailEnd type="arrow"/>
-          </a:ln>
-        </p:spPr>
-        <p:style>
-          <a:lnRef idx="1">
-            <a:schemeClr val="accent1"/>
-          </a:lnRef>
-          <a:fillRef idx="0">
-            <a:schemeClr val="accent1"/>
-          </a:fillRef>
-          <a:effectRef idx="0">
-            <a:schemeClr val="accent1"/>
-          </a:effectRef>
-          <a:fontRef idx="minor">
-            <a:schemeClr val="tx1"/>
-          </a:fontRef>
-        </p:style>
-      </p:cxnSp>
-      <p:grpSp>
-        <p:nvGrpSpPr>
-          <p:cNvPr id="194" name="Group 193"/>
-          <p:cNvGrpSpPr/>
-          <p:nvPr/>
-        </p:nvGrpSpPr>
-        <p:grpSpPr>
-          <a:xfrm>
-            <a:off x="3837535" y="10053082"/>
-            <a:ext cx="1371600" cy="369332"/>
-            <a:chOff x="16276331" y="8505829"/>
-            <a:chExt cx="1371600" cy="369332"/>
-          </a:xfrm>
-        </p:grpSpPr>
-        <p:sp>
-          <p:nvSpPr>
-            <p:cNvPr id="195" name="Isosceles Triangle 194"/>
-            <p:cNvSpPr/>
-            <p:nvPr/>
-          </p:nvSpPr>
-          <p:spPr>
-            <a:xfrm rot="16200000" flipH="1">
-              <a:off x="16305624" y="8567768"/>
-              <a:ext cx="186870" cy="245456"/>
-            </a:xfrm>
-            <a:prstGeom prst="triangle">
-              <a:avLst/>
-            </a:prstGeom>
-          </p:spPr>
-          <p:style>
-            <a:lnRef idx="2">
-              <a:schemeClr val="accent2">
-                <a:shade val="50000"/>
-              </a:schemeClr>
-            </a:lnRef>
-            <a:fillRef idx="1">
-              <a:schemeClr val="accent2"/>
-            </a:fillRef>
-            <a:effectRef idx="0">
-              <a:schemeClr val="accent2"/>
-            </a:effectRef>
-            <a:fontRef idx="minor">
-              <a:schemeClr val="lt1"/>
-            </a:fontRef>
-          </p:style>
-          <p:txBody>
-            <a:bodyPr rtlCol="0" anchor="ctr"/>
-            <a:lstStyle/>
-            <a:p>
-              <a:pPr algn="ctr"/>
-              <a:endParaRPr lang="en-US"/>
-            </a:p>
-          </p:txBody>
-        </p:sp>
-        <p:sp>
-          <p:nvSpPr>
-            <p:cNvPr id="196" name="TextBox 195"/>
-            <p:cNvSpPr txBox="1"/>
-            <p:nvPr/>
-          </p:nvSpPr>
-          <p:spPr>
-            <a:xfrm>
-              <a:off x="16525502" y="8505829"/>
-              <a:ext cx="1122429" cy="369332"/>
+              <a:off x="8843389" y="10124937"/>
+              <a:ext cx="1295400" cy="1027640"/>
             </a:xfrm>
             <a:prstGeom prst="rect">
               <a:avLst/>
@@ -5858,74 +5466,8 @@
                     <a:srgbClr val="C00000"/>
                   </a:solidFill>
                 </a:rPr>
-                <a:t>updates</a:t>
+                <a:t>Use to process command</a:t>
               </a:r>
-              <a:endParaRPr lang="en-US" sz="1800" dirty="0">
-                <a:solidFill>
-                  <a:srgbClr val="C00000"/>
-                </a:solidFill>
-              </a:endParaRPr>
-            </a:p>
-          </p:txBody>
-        </p:sp>
-      </p:grpSp>
-      <p:grpSp>
-        <p:nvGrpSpPr>
-          <p:cNvPr id="219" name="Group 218"/>
-          <p:cNvGrpSpPr/>
-          <p:nvPr/>
-        </p:nvGrpSpPr>
-        <p:grpSpPr>
-          <a:xfrm>
-            <a:off x="8763000" y="13346668"/>
-            <a:ext cx="1295400" cy="369332"/>
-            <a:chOff x="9258300" y="12456672"/>
-            <a:chExt cx="1295400" cy="369332"/>
-          </a:xfrm>
-        </p:grpSpPr>
-        <p:sp>
-          <p:nvSpPr>
-            <p:cNvPr id="193" name="TextBox 192"/>
-            <p:cNvSpPr txBox="1"/>
-            <p:nvPr/>
-          </p:nvSpPr>
-          <p:spPr>
-            <a:xfrm>
-              <a:off x="9258300" y="12456672"/>
-              <a:ext cx="1295400" cy="369332"/>
-            </a:xfrm>
-            <a:prstGeom prst="rect">
-              <a:avLst/>
-            </a:prstGeom>
-            <a:noFill/>
-          </p:spPr>
-          <p:txBody>
-            <a:bodyPr wrap="square" rtlCol="0">
-              <a:spAutoFit/>
-            </a:bodyPr>
-            <a:lstStyle/>
-            <a:p>
-              <a:r>
-                <a:rPr lang="en-US" sz="1800" dirty="0">
-                  <a:solidFill>
-                    <a:srgbClr val="C00000"/>
-                  </a:solidFill>
-                </a:rPr>
-                <a:t>c</a:t>
-              </a:r>
-              <a:r>
-                <a:rPr lang="en-US" sz="1800" dirty="0" smtClean="0">
-                  <a:solidFill>
-                    <a:srgbClr val="C00000"/>
-                  </a:solidFill>
-                </a:rPr>
-                <a:t>alls on</a:t>
-              </a:r>
-              <a:endParaRPr lang="en-US" sz="1800" dirty="0">
-                <a:solidFill>
-                  <a:srgbClr val="C00000"/>
-                </a:solidFill>
-              </a:endParaRPr>
             </a:p>
           </p:txBody>
         </p:sp>
@@ -5937,7 +5479,7 @@
           </p:nvSpPr>
           <p:spPr>
             <a:xfrm rot="5400000">
-              <a:off x="10223237" y="12505607"/>
+              <a:off x="10096954" y="10663740"/>
               <a:ext cx="186870" cy="245456"/>
             </a:xfrm>
             <a:prstGeom prst="triangle">
@@ -6148,9 +5690,9 @@
         </p:nvGrpSpPr>
         <p:grpSpPr>
           <a:xfrm>
-            <a:off x="8125905" y="14061068"/>
+            <a:off x="9282652" y="12655161"/>
             <a:ext cx="2313495" cy="369332"/>
-            <a:chOff x="8191501" y="14565124"/>
+            <a:chOff x="8191501" y="14308455"/>
             <a:chExt cx="2313495" cy="369332"/>
           </a:xfrm>
         </p:grpSpPr>
@@ -6162,7 +5704,7 @@
           </p:nvSpPr>
           <p:spPr>
             <a:xfrm rot="16200000" flipH="1">
-              <a:off x="8220794" y="14642837"/>
+              <a:off x="8220794" y="14352203"/>
               <a:ext cx="186870" cy="245456"/>
             </a:xfrm>
             <a:prstGeom prst="triangle">
@@ -6202,7 +5744,7 @@
           </p:nvSpPr>
           <p:spPr>
             <a:xfrm>
-              <a:off x="8458200" y="14565124"/>
+              <a:off x="8458200" y="14308455"/>
               <a:ext cx="2046796" cy="369332"/>
             </a:xfrm>
             <a:prstGeom prst="rect">
@@ -6230,7 +5772,15 @@
                     <a:srgbClr val="C00000"/>
                   </a:solidFill>
                 </a:rPr>
-                <a:t>eturns operation</a:t>
+                <a:t>eturns </a:t>
+              </a:r>
+              <a:r>
+                <a:rPr lang="en-US" sz="1800" dirty="0" smtClean="0">
+                  <a:solidFill>
+                    <a:srgbClr val="C00000"/>
+                  </a:solidFill>
+                </a:rPr>
+                <a:t>Operation</a:t>
               </a:r>
               <a:endParaRPr lang="en-US" sz="1800" dirty="0">
                 <a:solidFill>
@@ -6244,20 +5794,17 @@
       <p:cxnSp>
         <p:nvCxnSpPr>
           <p:cNvPr id="214" name="Elbow Connector 213"/>
-          <p:cNvCxnSpPr>
-            <a:stCxn id="10" idx="2"/>
-            <a:endCxn id="141" idx="0"/>
-          </p:cNvCxnSpPr>
+          <p:cNvCxnSpPr/>
           <p:nvPr/>
         </p:nvCxnSpPr>
         <p:spPr>
           <a:xfrm rot="5400000">
-            <a:off x="4828056" y="12141618"/>
-            <a:ext cx="3427362" cy="632527"/>
+            <a:off x="3711850" y="11623341"/>
+            <a:ext cx="3325035" cy="1600450"/>
           </a:xfrm>
           <a:prstGeom prst="bentConnector3">
             <a:avLst>
-              <a:gd name="adj1" fmla="val 86684"/>
+              <a:gd name="adj1" fmla="val 50000"/>
             </a:avLst>
           </a:prstGeom>
           <a:ln w="38100">
@@ -6288,7 +5835,7 @@
         </p:nvSpPr>
         <p:spPr>
           <a:xfrm rot="10800000">
-            <a:off x="6671130" y="15474824"/>
+            <a:off x="5782132" y="11652829"/>
             <a:ext cx="186870" cy="245456"/>
           </a:xfrm>
           <a:prstGeom prst="triangle">
@@ -6328,8 +5875,8 @@
         </p:nvSpPr>
         <p:spPr>
           <a:xfrm>
-            <a:off x="6057899" y="14865224"/>
-            <a:ext cx="1485901" cy="646331"/>
+            <a:off x="4705931" y="10870658"/>
+            <a:ext cx="1485901" cy="923330"/>
           </a:xfrm>
           <a:prstGeom prst="rect">
             <a:avLst/>
@@ -6360,8 +5907,11 @@
                   <a:srgbClr val="C00000"/>
                 </a:solidFill>
               </a:rPr>
-              <a:t>command</a:t>
-            </a:r>
+              <a:t>Operation</a:t>
+            </a:r>
+          </a:p>
+          <a:p>
+            <a:pPr algn="ctr"/>
             <a:endParaRPr lang="en-US" sz="1800" dirty="0">
               <a:solidFill>
                 <a:srgbClr val="C00000"/>
@@ -6381,53 +5931,16 @@
         </p:nvCxnSpPr>
         <p:spPr>
           <a:xfrm rot="16200000" flipH="1">
-            <a:off x="7591205" y="10010995"/>
-            <a:ext cx="3427362" cy="4893772"/>
+            <a:off x="7693014" y="10112803"/>
+            <a:ext cx="3384073" cy="4733443"/>
           </a:xfrm>
           <a:prstGeom prst="bentConnector3">
             <a:avLst>
-              <a:gd name="adj1" fmla="val 86684"/>
+              <a:gd name="adj1" fmla="val 55629"/>
             </a:avLst>
           </a:prstGeom>
           <a:ln w="38100">
             <a:prstDash val="solid"/>
-            <a:tailEnd type="arrow"/>
-          </a:ln>
-        </p:spPr>
-        <p:style>
-          <a:lnRef idx="1">
-            <a:schemeClr val="accent1"/>
-          </a:lnRef>
-          <a:fillRef idx="0">
-            <a:schemeClr val="accent1"/>
-          </a:fillRef>
-          <a:effectRef idx="0">
-            <a:schemeClr val="accent1"/>
-          </a:effectRef>
-          <a:fontRef idx="minor">
-            <a:schemeClr val="tx1"/>
-          </a:fontRef>
-        </p:style>
-      </p:cxnSp>
-      <p:cxnSp>
-        <p:nvCxnSpPr>
-          <p:cNvPr id="224" name="Straight Arrow Connector 223"/>
-          <p:cNvCxnSpPr>
-            <a:stCxn id="182" idx="1"/>
-            <a:endCxn id="141" idx="3"/>
-          </p:cNvCxnSpPr>
-          <p:nvPr/>
-        </p:nvCxnSpPr>
-        <p:spPr>
-          <a:xfrm flipH="1">
-            <a:off x="7726546" y="14430401"/>
-            <a:ext cx="2594398" cy="0"/>
-          </a:xfrm>
-          <a:prstGeom prst="straightConnector1">
-            <a:avLst/>
-          </a:prstGeom>
-          <a:ln w="38100">
-            <a:prstDash val="sysDot"/>
             <a:tailEnd type="arrow"/>
           </a:ln>
         </p:spPr>
@@ -6491,7 +6004,7 @@
         </p:nvSpPr>
         <p:spPr>
           <a:xfrm>
-            <a:off x="10667145" y="11941576"/>
+            <a:off x="11486349" y="11925256"/>
             <a:ext cx="2208044" cy="517677"/>
           </a:xfrm>
           <a:prstGeom prst="roundRect">
@@ -6525,78 +6038,6 @@
           </a:p>
         </p:txBody>
       </p:sp>
-      <p:cxnSp>
-        <p:nvCxnSpPr>
-          <p:cNvPr id="237" name="Straight Connector 236"/>
-          <p:cNvCxnSpPr>
-            <a:stCxn id="120" idx="2"/>
-            <a:endCxn id="234" idx="0"/>
-          </p:cNvCxnSpPr>
-          <p:nvPr/>
-        </p:nvCxnSpPr>
-        <p:spPr>
-          <a:xfrm>
-            <a:off x="11761313" y="10744200"/>
-            <a:ext cx="9854" cy="1197376"/>
-          </a:xfrm>
-          <a:prstGeom prst="line">
-            <a:avLst/>
-          </a:prstGeom>
-          <a:ln w="38100">
-            <a:prstDash val="sysDot"/>
-          </a:ln>
-        </p:spPr>
-        <p:style>
-          <a:lnRef idx="1">
-            <a:schemeClr val="accent1"/>
-          </a:lnRef>
-          <a:fillRef idx="0">
-            <a:schemeClr val="accent1"/>
-          </a:fillRef>
-          <a:effectRef idx="0">
-            <a:schemeClr val="accent1"/>
-          </a:effectRef>
-          <a:fontRef idx="minor">
-            <a:schemeClr val="tx1"/>
-          </a:fontRef>
-        </p:style>
-      </p:cxnSp>
-      <p:cxnSp>
-        <p:nvCxnSpPr>
-          <p:cNvPr id="240" name="Straight Connector 239"/>
-          <p:cNvCxnSpPr>
-            <a:stCxn id="234" idx="2"/>
-            <a:endCxn id="182" idx="0"/>
-          </p:cNvCxnSpPr>
-          <p:nvPr/>
-        </p:nvCxnSpPr>
-        <p:spPr>
-          <a:xfrm flipH="1">
-            <a:off x="11751772" y="12459253"/>
-            <a:ext cx="19395" cy="1712309"/>
-          </a:xfrm>
-          <a:prstGeom prst="line">
-            <a:avLst/>
-          </a:prstGeom>
-          <a:ln w="38100">
-            <a:prstDash val="sysDot"/>
-          </a:ln>
-        </p:spPr>
-        <p:style>
-          <a:lnRef idx="1">
-            <a:schemeClr val="accent1"/>
-          </a:lnRef>
-          <a:fillRef idx="0">
-            <a:schemeClr val="accent1"/>
-          </a:fillRef>
-          <a:effectRef idx="0">
-            <a:schemeClr val="accent1"/>
-          </a:effectRef>
-          <a:fontRef idx="minor">
-            <a:schemeClr val="tx1"/>
-          </a:fontRef>
-        </p:style>
-      </p:cxnSp>
       <p:sp>
         <p:nvSpPr>
           <p:cNvPr id="107" name="Isosceles Triangle 106"/>
@@ -6605,7 +6046,7 @@
         </p:nvSpPr>
         <p:spPr>
           <a:xfrm rot="10800000" flipH="1">
-            <a:off x="6137730" y="5562600"/>
+            <a:off x="5969003" y="4880278"/>
             <a:ext cx="186870" cy="245456"/>
           </a:xfrm>
           <a:prstGeom prst="triangle">
@@ -6645,7 +6086,7 @@
         </p:nvSpPr>
         <p:spPr>
           <a:xfrm>
-            <a:off x="5735571" y="5193268"/>
+            <a:off x="5566844" y="4510946"/>
             <a:ext cx="1122429" cy="369332"/>
           </a:xfrm>
           <a:prstGeom prst="rect">
@@ -6680,22 +6121,487 @@
           <p:cNvPr id="5" name="Elbow Connector 4"/>
           <p:cNvCxnSpPr>
             <a:stCxn id="120" idx="3"/>
-            <a:endCxn id="97" idx="3"/>
+            <a:endCxn id="97" idx="0"/>
           </p:cNvCxnSpPr>
           <p:nvPr/>
         </p:nvCxnSpPr>
         <p:spPr>
           <a:xfrm flipH="1" flipV="1">
-            <a:off x="7848600" y="4145039"/>
-            <a:ext cx="5158425" cy="6340323"/>
-          </a:xfrm>
-          <a:prstGeom prst="bentConnector3">
+            <a:off x="6819900" y="3886200"/>
+            <a:ext cx="7016183" cy="5723378"/>
+          </a:xfrm>
+          <a:prstGeom prst="bentConnector4">
             <a:avLst>
-              <a:gd name="adj1" fmla="val -12187"/>
+              <a:gd name="adj1" fmla="val -3258"/>
+              <a:gd name="adj2" fmla="val 103994"/>
             </a:avLst>
           </a:prstGeom>
+          <a:ln>
+            <a:prstDash val="sysDot"/>
+            <a:tailEnd type="arrow"/>
+          </a:ln>
+        </p:spPr>
+        <p:style>
+          <a:lnRef idx="3">
+            <a:schemeClr val="accent1"/>
+          </a:lnRef>
+          <a:fillRef idx="0">
+            <a:schemeClr val="accent1"/>
+          </a:fillRef>
+          <a:effectRef idx="2">
+            <a:schemeClr val="accent1"/>
+          </a:effectRef>
+          <a:fontRef idx="minor">
+            <a:schemeClr val="tx1"/>
+          </a:fontRef>
+        </p:style>
+      </p:cxnSp>
+      <p:sp>
+        <p:nvSpPr>
+          <p:cNvPr id="100" name="Isosceles Triangle 99"/>
+          <p:cNvSpPr/>
+          <p:nvPr/>
+        </p:nvSpPr>
+        <p:spPr>
+          <a:xfrm rot="10800000" flipV="1">
+            <a:off x="4195810" y="13041856"/>
+            <a:ext cx="186870" cy="245456"/>
+          </a:xfrm>
+          <a:prstGeom prst="triangle">
+            <a:avLst/>
+          </a:prstGeom>
+        </p:spPr>
+        <p:style>
+          <a:lnRef idx="2">
+            <a:schemeClr val="accent2">
+              <a:shade val="50000"/>
+            </a:schemeClr>
+          </a:lnRef>
+          <a:fillRef idx="1">
+            <a:schemeClr val="accent2"/>
+          </a:fillRef>
+          <a:effectRef idx="0">
+            <a:schemeClr val="accent2"/>
+          </a:effectRef>
+          <a:fontRef idx="minor">
+            <a:schemeClr val="lt1"/>
+          </a:fontRef>
+        </p:style>
+        <p:txBody>
+          <a:bodyPr rtlCol="0" anchor="ctr"/>
+          <a:lstStyle/>
+          <a:p>
+            <a:pPr algn="ctr"/>
+            <a:endParaRPr lang="en-US"/>
+          </a:p>
+        </p:txBody>
+      </p:sp>
+      <p:sp>
+        <p:nvSpPr>
+          <p:cNvPr id="104" name="TextBox 103"/>
+          <p:cNvSpPr txBox="1"/>
+          <p:nvPr/>
+        </p:nvSpPr>
+        <p:spPr>
+          <a:xfrm>
+            <a:off x="3510010" y="13287312"/>
+            <a:ext cx="1028701" cy="646331"/>
+          </a:xfrm>
+          <a:prstGeom prst="rect">
+            <a:avLst/>
+          </a:prstGeom>
+          <a:noFill/>
+        </p:spPr>
+        <p:txBody>
+          <a:bodyPr wrap="square" rtlCol="0">
+            <a:spAutoFit/>
+          </a:bodyPr>
+          <a:lstStyle/>
+          <a:p>
+            <a:pPr algn="ctr"/>
+            <a:r>
+              <a:rPr lang="en-US" sz="1800" dirty="0" smtClean="0">
+                <a:solidFill>
+                  <a:srgbClr val="C00000"/>
+                </a:solidFill>
+              </a:rPr>
+              <a:t>Returns </a:t>
+            </a:r>
+            <a:r>
+              <a:rPr lang="en-US" sz="1800" dirty="0" smtClean="0">
+                <a:solidFill>
+                  <a:srgbClr val="C00000"/>
+                </a:solidFill>
+              </a:rPr>
+              <a:t>feedback</a:t>
+            </a:r>
+          </a:p>
+        </p:txBody>
+      </p:sp>
+      <p:sp>
+        <p:nvSpPr>
+          <p:cNvPr id="105" name="Isosceles Triangle 104"/>
+          <p:cNvSpPr/>
+          <p:nvPr/>
+        </p:nvSpPr>
+        <p:spPr>
+          <a:xfrm rot="10800000">
+            <a:off x="5232222" y="15258509"/>
+            <a:ext cx="186870" cy="245456"/>
+          </a:xfrm>
+          <a:prstGeom prst="triangle">
+            <a:avLst/>
+          </a:prstGeom>
+        </p:spPr>
+        <p:style>
+          <a:lnRef idx="2">
+            <a:schemeClr val="accent2">
+              <a:shade val="50000"/>
+            </a:schemeClr>
+          </a:lnRef>
+          <a:fillRef idx="1">
+            <a:schemeClr val="accent2"/>
+          </a:fillRef>
+          <a:effectRef idx="0">
+            <a:schemeClr val="accent2"/>
+          </a:effectRef>
+          <a:fontRef idx="minor">
+            <a:schemeClr val="lt1"/>
+          </a:fontRef>
+        </p:style>
+        <p:txBody>
+          <a:bodyPr rtlCol="0" anchor="ctr"/>
+          <a:lstStyle/>
+          <a:p>
+            <a:pPr algn="ctr"/>
+            <a:endParaRPr lang="en-US"/>
+          </a:p>
+        </p:txBody>
+      </p:sp>
+      <p:sp>
+        <p:nvSpPr>
+          <p:cNvPr id="106" name="TextBox 105"/>
+          <p:cNvSpPr txBox="1"/>
+          <p:nvPr/>
+        </p:nvSpPr>
+        <p:spPr>
+          <a:xfrm>
+            <a:off x="5016774" y="14865816"/>
+            <a:ext cx="1485901" cy="369332"/>
+          </a:xfrm>
+          <a:prstGeom prst="rect">
+            <a:avLst/>
+          </a:prstGeom>
+          <a:noFill/>
+        </p:spPr>
+        <p:txBody>
+          <a:bodyPr wrap="square" rtlCol="0">
+            <a:spAutoFit/>
+          </a:bodyPr>
+          <a:lstStyle/>
+          <a:p>
+            <a:pPr algn="ctr"/>
+            <a:r>
+              <a:rPr lang="en-US" sz="1800" dirty="0" smtClean="0">
+                <a:solidFill>
+                  <a:srgbClr val="C00000"/>
+                </a:solidFill>
+              </a:rPr>
+              <a:t>Store data in</a:t>
+            </a:r>
+            <a:endParaRPr lang="en-US" sz="1800" dirty="0">
+              <a:solidFill>
+                <a:srgbClr val="C00000"/>
+              </a:solidFill>
+            </a:endParaRPr>
+          </a:p>
+        </p:txBody>
+      </p:sp>
+      <p:sp>
+        <p:nvSpPr>
+          <p:cNvPr id="111" name="Isosceles Triangle 110"/>
+          <p:cNvSpPr/>
+          <p:nvPr/>
+        </p:nvSpPr>
+        <p:spPr>
+          <a:xfrm rot="16200000" flipH="1">
+            <a:off x="12093848" y="3251554"/>
+            <a:ext cx="186870" cy="245456"/>
+          </a:xfrm>
+          <a:prstGeom prst="triangle">
+            <a:avLst/>
+          </a:prstGeom>
+        </p:spPr>
+        <p:style>
+          <a:lnRef idx="2">
+            <a:schemeClr val="accent2">
+              <a:shade val="50000"/>
+            </a:schemeClr>
+          </a:lnRef>
+          <a:fillRef idx="1">
+            <a:schemeClr val="accent2"/>
+          </a:fillRef>
+          <a:effectRef idx="0">
+            <a:schemeClr val="accent2"/>
+          </a:effectRef>
+          <a:fontRef idx="minor">
+            <a:schemeClr val="lt1"/>
+          </a:fontRef>
+        </p:style>
+        <p:txBody>
+          <a:bodyPr rtlCol="0" anchor="ctr"/>
+          <a:lstStyle/>
+          <a:p>
+            <a:pPr algn="ctr"/>
+            <a:endParaRPr lang="en-US"/>
+          </a:p>
+        </p:txBody>
+      </p:sp>
+      <p:cxnSp>
+        <p:nvCxnSpPr>
+          <p:cNvPr id="132" name="Straight Arrow Connector 131"/>
+          <p:cNvCxnSpPr>
+            <a:stCxn id="120" idx="2"/>
+            <a:endCxn id="234" idx="0"/>
+          </p:cNvCxnSpPr>
+          <p:nvPr/>
+        </p:nvCxnSpPr>
+        <p:spPr>
+          <a:xfrm>
+            <a:off x="12590371" y="9868416"/>
+            <a:ext cx="0" cy="2056840"/>
+          </a:xfrm>
+          <a:prstGeom prst="straightConnector1">
+            <a:avLst/>
+          </a:prstGeom>
+          <a:ln>
+            <a:tailEnd type="arrow"/>
+          </a:ln>
+        </p:spPr>
+        <p:style>
+          <a:lnRef idx="3">
+            <a:schemeClr val="accent1"/>
+          </a:lnRef>
+          <a:fillRef idx="0">
+            <a:schemeClr val="accent1"/>
+          </a:fillRef>
+          <a:effectRef idx="2">
+            <a:schemeClr val="accent1"/>
+          </a:effectRef>
+          <a:fontRef idx="minor">
+            <a:schemeClr val="tx1"/>
+          </a:fontRef>
+        </p:style>
+      </p:cxnSp>
+      <p:sp>
+        <p:nvSpPr>
+          <p:cNvPr id="142" name="Isosceles Triangle 141"/>
+          <p:cNvSpPr/>
+          <p:nvPr/>
+        </p:nvSpPr>
+        <p:spPr>
+          <a:xfrm rot="10800000">
+            <a:off x="12268201" y="10270143"/>
+            <a:ext cx="186870" cy="245456"/>
+          </a:xfrm>
+          <a:prstGeom prst="triangle">
+            <a:avLst/>
+          </a:prstGeom>
+        </p:spPr>
+        <p:style>
+          <a:lnRef idx="2">
+            <a:schemeClr val="accent2">
+              <a:shade val="50000"/>
+            </a:schemeClr>
+          </a:lnRef>
+          <a:fillRef idx="1">
+            <a:schemeClr val="accent2"/>
+          </a:fillRef>
+          <a:effectRef idx="0">
+            <a:schemeClr val="accent2"/>
+          </a:effectRef>
+          <a:fontRef idx="minor">
+            <a:schemeClr val="lt1"/>
+          </a:fontRef>
+        </p:style>
+        <p:txBody>
+          <a:bodyPr rtlCol="0" anchor="ctr"/>
+          <a:lstStyle/>
+          <a:p>
+            <a:pPr algn="ctr"/>
+            <a:endParaRPr lang="en-US"/>
+          </a:p>
+        </p:txBody>
+      </p:sp>
+      <p:sp>
+        <p:nvSpPr>
+          <p:cNvPr id="143" name="TextBox 142"/>
+          <p:cNvSpPr txBox="1"/>
+          <p:nvPr/>
+        </p:nvSpPr>
+        <p:spPr>
+          <a:xfrm>
+            <a:off x="11256734" y="9906000"/>
+            <a:ext cx="1485901" cy="369332"/>
+          </a:xfrm>
+          <a:prstGeom prst="rect">
+            <a:avLst/>
+          </a:prstGeom>
+          <a:noFill/>
+        </p:spPr>
+        <p:txBody>
+          <a:bodyPr wrap="square" rtlCol="0">
+            <a:spAutoFit/>
+          </a:bodyPr>
+          <a:lstStyle/>
+          <a:p>
+            <a:pPr algn="ctr"/>
+            <a:r>
+              <a:rPr lang="en-US" sz="1800" dirty="0" smtClean="0">
+                <a:solidFill>
+                  <a:srgbClr val="C00000"/>
+                </a:solidFill>
+              </a:rPr>
+              <a:t>generates</a:t>
+            </a:r>
+            <a:endParaRPr lang="en-US" sz="1800" dirty="0">
+              <a:solidFill>
+                <a:srgbClr val="C00000"/>
+              </a:solidFill>
+            </a:endParaRPr>
+          </a:p>
+        </p:txBody>
+      </p:sp>
+      <p:cxnSp>
+        <p:nvCxnSpPr>
+          <p:cNvPr id="144" name="Straight Arrow Connector 143"/>
+          <p:cNvCxnSpPr/>
+          <p:nvPr/>
+        </p:nvCxnSpPr>
+        <p:spPr>
+          <a:xfrm>
+            <a:off x="12568796" y="12399743"/>
+            <a:ext cx="0" cy="1771819"/>
+          </a:xfrm>
+          <a:prstGeom prst="straightConnector1">
+            <a:avLst/>
+          </a:prstGeom>
+          <a:ln>
+            <a:tailEnd type="arrow"/>
+          </a:ln>
+        </p:spPr>
+        <p:style>
+          <a:lnRef idx="3">
+            <a:schemeClr val="accent1"/>
+          </a:lnRef>
+          <a:fillRef idx="0">
+            <a:schemeClr val="accent1"/>
+          </a:fillRef>
+          <a:effectRef idx="2">
+            <a:schemeClr val="accent1"/>
+          </a:effectRef>
+          <a:fontRef idx="minor">
+            <a:schemeClr val="tx1"/>
+          </a:fontRef>
+        </p:style>
+      </p:cxnSp>
+      <p:sp>
+        <p:nvSpPr>
+          <p:cNvPr id="145" name="Isosceles Triangle 144"/>
+          <p:cNvSpPr/>
+          <p:nvPr/>
+        </p:nvSpPr>
+        <p:spPr>
+          <a:xfrm rot="10800000">
+            <a:off x="13947521" y="17534066"/>
+            <a:ext cx="186870" cy="245456"/>
+          </a:xfrm>
+          <a:prstGeom prst="triangle">
+            <a:avLst/>
+          </a:prstGeom>
+        </p:spPr>
+        <p:style>
+          <a:lnRef idx="2">
+            <a:schemeClr val="accent2">
+              <a:shade val="50000"/>
+            </a:schemeClr>
+          </a:lnRef>
+          <a:fillRef idx="1">
+            <a:schemeClr val="accent2"/>
+          </a:fillRef>
+          <a:effectRef idx="0">
+            <a:schemeClr val="accent2"/>
+          </a:effectRef>
+          <a:fontRef idx="minor">
+            <a:schemeClr val="lt1"/>
+          </a:fontRef>
+        </p:style>
+        <p:txBody>
+          <a:bodyPr rtlCol="0" anchor="ctr"/>
+          <a:lstStyle/>
+          <a:p>
+            <a:pPr algn="ctr"/>
+            <a:endParaRPr lang="en-US"/>
+          </a:p>
+        </p:txBody>
+      </p:sp>
+      <p:sp>
+        <p:nvSpPr>
+          <p:cNvPr id="146" name="TextBox 145"/>
+          <p:cNvSpPr txBox="1"/>
+          <p:nvPr/>
+        </p:nvSpPr>
+        <p:spPr>
+          <a:xfrm>
+            <a:off x="13334290" y="17212939"/>
+            <a:ext cx="1485901" cy="369332"/>
+          </a:xfrm>
+          <a:prstGeom prst="rect">
+            <a:avLst/>
+          </a:prstGeom>
+          <a:noFill/>
+        </p:spPr>
+        <p:txBody>
+          <a:bodyPr wrap="square" rtlCol="0">
+            <a:spAutoFit/>
+          </a:bodyPr>
+          <a:lstStyle/>
+          <a:p>
+            <a:pPr algn="ctr"/>
+            <a:r>
+              <a:rPr lang="en-US" sz="1800" dirty="0" smtClean="0">
+                <a:solidFill>
+                  <a:srgbClr val="C00000"/>
+                </a:solidFill>
+              </a:rPr>
+              <a:t>contains</a:t>
+            </a:r>
+            <a:endParaRPr lang="en-US" sz="1800" dirty="0">
+              <a:solidFill>
+                <a:srgbClr val="C00000"/>
+              </a:solidFill>
+            </a:endParaRPr>
+          </a:p>
+        </p:txBody>
+      </p:sp>
+      <p:cxnSp>
+        <p:nvCxnSpPr>
+          <p:cNvPr id="147" name="Elbow Connector 146"/>
+          <p:cNvCxnSpPr>
+            <a:stCxn id="182" idx="3"/>
+          </p:cNvCxnSpPr>
+          <p:nvPr/>
+        </p:nvCxnSpPr>
+        <p:spPr>
+          <a:xfrm flipV="1">
+            <a:off x="13182600" y="9868416"/>
+            <a:ext cx="590306" cy="4561985"/>
+          </a:xfrm>
+          <a:prstGeom prst="bentConnector2">
+            <a:avLst/>
+          </a:prstGeom>
           <a:ln w="38100">
-            <a:prstDash val="sysDot"/>
+            <a:prstDash val="solid"/>
             <a:tailEnd type="arrow"/>
           </a:ln>
         </p:spPr>
@@ -6714,6 +6620,161 @@
           </a:fontRef>
         </p:style>
       </p:cxnSp>
+      <p:sp>
+        <p:nvSpPr>
+          <p:cNvPr id="156" name="TextBox 155"/>
+          <p:cNvSpPr txBox="1"/>
+          <p:nvPr/>
+        </p:nvSpPr>
+        <p:spPr>
+          <a:xfrm>
+            <a:off x="12344400" y="13700501"/>
+            <a:ext cx="1485901" cy="369332"/>
+          </a:xfrm>
+          <a:prstGeom prst="rect">
+            <a:avLst/>
+          </a:prstGeom>
+          <a:noFill/>
+        </p:spPr>
+        <p:txBody>
+          <a:bodyPr wrap="square" rtlCol="0">
+            <a:spAutoFit/>
+          </a:bodyPr>
+          <a:lstStyle/>
+          <a:p>
+            <a:pPr algn="ctr"/>
+            <a:r>
+              <a:rPr lang="en-US" sz="1800" dirty="0" smtClean="0">
+                <a:solidFill>
+                  <a:srgbClr val="C00000"/>
+                </a:solidFill>
+              </a:rPr>
+              <a:t>processes</a:t>
+            </a:r>
+            <a:endParaRPr lang="en-US" sz="1800" dirty="0">
+              <a:solidFill>
+                <a:srgbClr val="C00000"/>
+              </a:solidFill>
+            </a:endParaRPr>
+          </a:p>
+        </p:txBody>
+      </p:sp>
+      <p:sp>
+        <p:nvSpPr>
+          <p:cNvPr id="157" name="Isosceles Triangle 156"/>
+          <p:cNvSpPr/>
+          <p:nvPr/>
+        </p:nvSpPr>
+        <p:spPr>
+          <a:xfrm rot="5400000">
+            <a:off x="13814342" y="14481031"/>
+            <a:ext cx="167902" cy="245456"/>
+          </a:xfrm>
+          <a:prstGeom prst="triangle">
+            <a:avLst/>
+          </a:prstGeom>
+        </p:spPr>
+        <p:style>
+          <a:lnRef idx="2">
+            <a:schemeClr val="accent2">
+              <a:shade val="50000"/>
+            </a:schemeClr>
+          </a:lnRef>
+          <a:fillRef idx="1">
+            <a:schemeClr val="accent2"/>
+          </a:fillRef>
+          <a:effectRef idx="0">
+            <a:schemeClr val="accent2"/>
+          </a:effectRef>
+          <a:fontRef idx="minor">
+            <a:schemeClr val="lt1"/>
+          </a:fontRef>
+        </p:style>
+        <p:txBody>
+          <a:bodyPr rtlCol="0" anchor="ctr"/>
+          <a:lstStyle/>
+          <a:p>
+            <a:pPr algn="ctr"/>
+            <a:endParaRPr lang="en-US"/>
+          </a:p>
+        </p:txBody>
+      </p:sp>
+      <p:cxnSp>
+        <p:nvCxnSpPr>
+          <p:cNvPr id="163" name="Elbow Connector 162"/>
+          <p:cNvCxnSpPr>
+            <a:endCxn id="184" idx="1"/>
+          </p:cNvCxnSpPr>
+          <p:nvPr/>
+        </p:nvCxnSpPr>
+        <p:spPr>
+          <a:xfrm rot="16200000" flipH="1">
+            <a:off x="5721350" y="11728974"/>
+            <a:ext cx="5571025" cy="3635175"/>
+          </a:xfrm>
+          <a:prstGeom prst="bentConnector2">
+            <a:avLst/>
+          </a:prstGeom>
+          <a:ln w="38100">
+            <a:prstDash val="solid"/>
+            <a:tailEnd type="arrow"/>
+          </a:ln>
+        </p:spPr>
+        <p:style>
+          <a:lnRef idx="1">
+            <a:schemeClr val="accent1"/>
+          </a:lnRef>
+          <a:fillRef idx="0">
+            <a:schemeClr val="accent1"/>
+          </a:fillRef>
+          <a:effectRef idx="0">
+            <a:schemeClr val="accent1"/>
+          </a:effectRef>
+          <a:fontRef idx="minor">
+            <a:schemeClr val="tx1"/>
+          </a:fontRef>
+        </p:style>
+      </p:cxnSp>
+      <p:sp>
+        <p:nvSpPr>
+          <p:cNvPr id="189" name="Isosceles Triangle 188"/>
+          <p:cNvSpPr/>
+          <p:nvPr/>
+        </p:nvSpPr>
+        <p:spPr>
+          <a:xfrm rot="10800000" flipV="1">
+            <a:off x="12649201" y="13470543"/>
+            <a:ext cx="186870" cy="245456"/>
+          </a:xfrm>
+          <a:prstGeom prst="triangle">
+            <a:avLst/>
+          </a:prstGeom>
+        </p:spPr>
+        <p:style>
+          <a:lnRef idx="2">
+            <a:schemeClr val="accent2">
+              <a:shade val="50000"/>
+            </a:schemeClr>
+          </a:lnRef>
+          <a:fillRef idx="1">
+            <a:schemeClr val="accent2"/>
+          </a:fillRef>
+          <a:effectRef idx="0">
+            <a:schemeClr val="accent2"/>
+          </a:effectRef>
+          <a:fontRef idx="minor">
+            <a:schemeClr val="lt1"/>
+          </a:fontRef>
+        </p:style>
+        <p:txBody>
+          <a:bodyPr rtlCol="0" anchor="ctr"/>
+          <a:lstStyle/>
+          <a:p>
+            <a:pPr algn="ctr"/>
+            <a:endParaRPr lang="en-US"/>
+          </a:p>
+        </p:txBody>
+      </p:sp>
     </p:spTree>
     <p:extLst>
       <p:ext uri="{BB962C8B-B14F-4D97-AF65-F5344CB8AC3E}">

</xml_diff>

<commit_message>
push updated raw docs
</commit_message>
<xml_diff>
--- a/doc/classDiagram.pptx
+++ b/doc/classDiagram.pptx
@@ -3258,1209 +3258,6 @@
           </a:fontRef>
         </p:style>
       </p:cxnSp>
-      <p:grpSp>
-        <p:nvGrpSpPr>
-          <p:cNvPr id="233" name="Group 232"/>
-          <p:cNvGrpSpPr/>
-          <p:nvPr/>
-        </p:nvGrpSpPr>
-        <p:grpSpPr>
-          <a:xfrm>
-            <a:off x="15495205" y="7571601"/>
-            <a:ext cx="16268698" cy="6664634"/>
-            <a:chOff x="266702" y="21529366"/>
-            <a:chExt cx="16268698" cy="6664634"/>
-          </a:xfrm>
-        </p:grpSpPr>
-        <p:grpSp>
-          <p:nvGrpSpPr>
-            <p:cNvPr id="94" name="Group 93"/>
-            <p:cNvGrpSpPr/>
-            <p:nvPr/>
-          </p:nvGrpSpPr>
-          <p:grpSpPr>
-            <a:xfrm>
-              <a:off x="508001" y="21529366"/>
-              <a:ext cx="16027399" cy="2806254"/>
-              <a:chOff x="508001" y="21529366"/>
-              <a:chExt cx="16027399" cy="2806254"/>
-            </a:xfrm>
-          </p:grpSpPr>
-          <p:sp>
-            <p:nvSpPr>
-              <p:cNvPr id="20" name="Rounded Rectangle 19"/>
-              <p:cNvSpPr/>
-              <p:nvPr/>
-            </p:nvSpPr>
-            <p:spPr>
-              <a:xfrm>
-                <a:off x="6969378" y="21529366"/>
-                <a:ext cx="2262320" cy="969762"/>
-              </a:xfrm>
-              <a:prstGeom prst="roundRect">
-                <a:avLst/>
-              </a:prstGeom>
-            </p:spPr>
-            <p:style>
-              <a:lnRef idx="1">
-                <a:schemeClr val="accent5"/>
-              </a:lnRef>
-              <a:fillRef idx="2">
-                <a:schemeClr val="accent5"/>
-              </a:fillRef>
-              <a:effectRef idx="1">
-                <a:schemeClr val="accent5"/>
-              </a:effectRef>
-              <a:fontRef idx="minor">
-                <a:schemeClr val="dk1"/>
-              </a:fontRef>
-            </p:style>
-            <p:txBody>
-              <a:bodyPr lIns="522481" tIns="261241" rIns="522481" bIns="261241" spcCol="0" rtlCol="0" anchor="ctr"/>
-              <a:lstStyle/>
-              <a:p>
-                <a:pPr algn="ctr"/>
-                <a:r>
-                  <a:rPr lang="en-US" sz="3200" dirty="0" smtClean="0"/>
-                  <a:t>Token</a:t>
-                </a:r>
-                <a:endParaRPr lang="en-US" sz="3600" dirty="0"/>
-              </a:p>
-            </p:txBody>
-          </p:sp>
-          <p:sp>
-            <p:nvSpPr>
-              <p:cNvPr id="21" name="Rounded Rectangle 20"/>
-              <p:cNvSpPr/>
-              <p:nvPr/>
-            </p:nvSpPr>
-            <p:spPr>
-              <a:xfrm>
-                <a:off x="508001" y="23527948"/>
-                <a:ext cx="2322057" cy="807672"/>
-              </a:xfrm>
-              <a:prstGeom prst="roundRect">
-                <a:avLst/>
-              </a:prstGeom>
-            </p:spPr>
-            <p:style>
-              <a:lnRef idx="1">
-                <a:schemeClr val="accent5"/>
-              </a:lnRef>
-              <a:fillRef idx="2">
-                <a:schemeClr val="accent5"/>
-              </a:fillRef>
-              <a:effectRef idx="1">
-                <a:schemeClr val="accent5"/>
-              </a:effectRef>
-              <a:fontRef idx="minor">
-                <a:schemeClr val="dk1"/>
-              </a:fontRef>
-            </p:style>
-            <p:txBody>
-              <a:bodyPr lIns="522481" tIns="261241" rIns="522481" bIns="261241" spcCol="0" rtlCol="0" anchor="ctr"/>
-              <a:lstStyle/>
-              <a:p>
-                <a:pPr algn="ctr"/>
-                <a:r>
-                  <a:rPr lang="en-US" sz="2000" dirty="0" err="1"/>
-                  <a:t>TokenDate</a:t>
-                </a:r>
-                <a:endParaRPr lang="en-US" sz="2000" dirty="0"/>
-              </a:p>
-            </p:txBody>
-          </p:sp>
-          <p:sp>
-            <p:nvSpPr>
-              <p:cNvPr id="22" name="Rounded Rectangle 21"/>
-              <p:cNvSpPr/>
-              <p:nvPr/>
-            </p:nvSpPr>
-            <p:spPr>
-              <a:xfrm>
-                <a:off x="3031976" y="23527948"/>
-                <a:ext cx="2725893" cy="807672"/>
-              </a:xfrm>
-              <a:prstGeom prst="roundRect">
-                <a:avLst/>
-              </a:prstGeom>
-            </p:spPr>
-            <p:style>
-              <a:lnRef idx="1">
-                <a:schemeClr val="accent5"/>
-              </a:lnRef>
-              <a:fillRef idx="2">
-                <a:schemeClr val="accent5"/>
-              </a:fillRef>
-              <a:effectRef idx="1">
-                <a:schemeClr val="accent5"/>
-              </a:effectRef>
-              <a:fontRef idx="minor">
-                <a:schemeClr val="dk1"/>
-              </a:fontRef>
-            </p:style>
-            <p:txBody>
-              <a:bodyPr lIns="522481" tIns="261241" rIns="522481" bIns="261241" spcCol="0" rtlCol="0" anchor="ctr"/>
-              <a:lstStyle/>
-              <a:p>
-                <a:pPr algn="ctr"/>
-                <a:r>
-                  <a:rPr lang="en-US" sz="2000" dirty="0" err="1"/>
-                  <a:t>TokenTime</a:t>
-                </a:r>
-                <a:endParaRPr lang="en-US" sz="2000" dirty="0"/>
-              </a:p>
-            </p:txBody>
-          </p:sp>
-          <p:sp>
-            <p:nvSpPr>
-              <p:cNvPr id="23" name="Rounded Rectangle 22"/>
-              <p:cNvSpPr/>
-              <p:nvPr/>
-            </p:nvSpPr>
-            <p:spPr>
-              <a:xfrm>
-                <a:off x="5959787" y="23527948"/>
-                <a:ext cx="2221098" cy="807672"/>
-              </a:xfrm>
-              <a:prstGeom prst="roundRect">
-                <a:avLst/>
-              </a:prstGeom>
-            </p:spPr>
-            <p:style>
-              <a:lnRef idx="1">
-                <a:schemeClr val="accent5"/>
-              </a:lnRef>
-              <a:fillRef idx="2">
-                <a:schemeClr val="accent5"/>
-              </a:fillRef>
-              <a:effectRef idx="1">
-                <a:schemeClr val="accent5"/>
-              </a:effectRef>
-              <a:fontRef idx="minor">
-                <a:schemeClr val="dk1"/>
-              </a:fontRef>
-            </p:style>
-            <p:txBody>
-              <a:bodyPr lIns="522481" tIns="261241" rIns="522481" bIns="261241" spcCol="0" rtlCol="0" anchor="ctr"/>
-              <a:lstStyle/>
-              <a:p>
-                <a:pPr algn="ctr"/>
-                <a:r>
-                  <a:rPr lang="en-US" sz="2000" dirty="0" err="1"/>
-                  <a:t>TokenDay</a:t>
-                </a:r>
-                <a:endParaRPr lang="en-US" sz="2000" dirty="0"/>
-              </a:p>
-            </p:txBody>
-          </p:sp>
-          <p:sp>
-            <p:nvSpPr>
-              <p:cNvPr id="24" name="Rounded Rectangle 23"/>
-              <p:cNvSpPr/>
-              <p:nvPr/>
-            </p:nvSpPr>
-            <p:spPr>
-              <a:xfrm>
-                <a:off x="8382803" y="23527948"/>
-                <a:ext cx="2735508" cy="807672"/>
-              </a:xfrm>
-              <a:prstGeom prst="roundRect">
-                <a:avLst/>
-              </a:prstGeom>
-            </p:spPr>
-            <p:style>
-              <a:lnRef idx="1">
-                <a:schemeClr val="accent5"/>
-              </a:lnRef>
-              <a:fillRef idx="2">
-                <a:schemeClr val="accent5"/>
-              </a:fillRef>
-              <a:effectRef idx="1">
-                <a:schemeClr val="accent5"/>
-              </a:effectRef>
-              <a:fontRef idx="minor">
-                <a:schemeClr val="dk1"/>
-              </a:fontRef>
-            </p:style>
-            <p:txBody>
-              <a:bodyPr lIns="522481" tIns="261241" rIns="522481" bIns="261241" spcCol="0" rtlCol="0" anchor="ctr"/>
-              <a:lstStyle/>
-              <a:p>
-                <a:pPr algn="ctr"/>
-                <a:r>
-                  <a:rPr lang="en-US" sz="2000" dirty="0" err="1"/>
-                  <a:t>TokenContext</a:t>
-                </a:r>
-                <a:endParaRPr lang="en-US" sz="2000" dirty="0"/>
-              </a:p>
-            </p:txBody>
-          </p:sp>
-          <p:sp>
-            <p:nvSpPr>
-              <p:cNvPr id="25" name="Rounded Rectangle 24"/>
-              <p:cNvSpPr/>
-              <p:nvPr/>
-            </p:nvSpPr>
-            <p:spPr>
-              <a:xfrm>
-                <a:off x="11282648" y="23527948"/>
-                <a:ext cx="2509552" cy="807672"/>
-              </a:xfrm>
-              <a:prstGeom prst="roundRect">
-                <a:avLst/>
-              </a:prstGeom>
-            </p:spPr>
-            <p:style>
-              <a:lnRef idx="1">
-                <a:schemeClr val="accent5"/>
-              </a:lnRef>
-              <a:fillRef idx="2">
-                <a:schemeClr val="accent5"/>
-              </a:fillRef>
-              <a:effectRef idx="1">
-                <a:schemeClr val="accent5"/>
-              </a:effectRef>
-              <a:fontRef idx="minor">
-                <a:schemeClr val="dk1"/>
-              </a:fontRef>
-            </p:style>
-            <p:txBody>
-              <a:bodyPr lIns="522481" tIns="261241" rIns="522481" bIns="261241" spcCol="0" rtlCol="0" anchor="ctr"/>
-              <a:lstStyle/>
-              <a:p>
-                <a:pPr algn="ctr"/>
-                <a:r>
-                  <a:rPr lang="en-US" sz="2000" dirty="0" err="1"/>
-                  <a:t>TokenIndex</a:t>
-                </a:r>
-                <a:endParaRPr lang="en-US" sz="2000" dirty="0"/>
-              </a:p>
-            </p:txBody>
-          </p:sp>
-          <p:sp>
-            <p:nvSpPr>
-              <p:cNvPr id="26" name="Rounded Rectangle 25"/>
-              <p:cNvSpPr/>
-              <p:nvPr/>
-            </p:nvSpPr>
-            <p:spPr>
-              <a:xfrm>
-                <a:off x="14025848" y="23527948"/>
-                <a:ext cx="2509552" cy="807672"/>
-              </a:xfrm>
-              <a:prstGeom prst="roundRect">
-                <a:avLst/>
-              </a:prstGeom>
-            </p:spPr>
-            <p:style>
-              <a:lnRef idx="1">
-                <a:schemeClr val="accent5"/>
-              </a:lnRef>
-              <a:fillRef idx="2">
-                <a:schemeClr val="accent5"/>
-              </a:fillRef>
-              <a:effectRef idx="1">
-                <a:schemeClr val="accent5"/>
-              </a:effectRef>
-              <a:fontRef idx="minor">
-                <a:schemeClr val="dk1"/>
-              </a:fontRef>
-            </p:style>
-            <p:txBody>
-              <a:bodyPr lIns="522481" tIns="261241" rIns="522481" bIns="261241" spcCol="0" rtlCol="0" anchor="ctr"/>
-              <a:lstStyle/>
-              <a:p>
-                <a:pPr algn="ctr"/>
-                <a:r>
-                  <a:rPr lang="en-US" sz="2000" dirty="0" err="1"/>
-                  <a:t>TokenLiteral</a:t>
-                </a:r>
-                <a:endParaRPr lang="en-US" sz="2000" dirty="0"/>
-              </a:p>
-            </p:txBody>
-          </p:sp>
-          <p:cxnSp>
-            <p:nvCxnSpPr>
-              <p:cNvPr id="45" name="Elbow Connector 44"/>
-              <p:cNvCxnSpPr>
-                <a:stCxn id="21" idx="0"/>
-                <a:endCxn id="20" idx="1"/>
-              </p:cNvCxnSpPr>
-              <p:nvPr/>
-            </p:nvCxnSpPr>
-            <p:spPr>
-              <a:xfrm rot="5400000" flipH="1" flipV="1">
-                <a:off x="3562354" y="20120924"/>
-                <a:ext cx="1513701" cy="5300348"/>
-              </a:xfrm>
-              <a:prstGeom prst="bentConnector2">
-                <a:avLst/>
-              </a:prstGeom>
-              <a:ln w="38100">
-                <a:tailEnd type="arrow"/>
-              </a:ln>
-            </p:spPr>
-            <p:style>
-              <a:lnRef idx="1">
-                <a:schemeClr val="accent1"/>
-              </a:lnRef>
-              <a:fillRef idx="0">
-                <a:schemeClr val="accent1"/>
-              </a:fillRef>
-              <a:effectRef idx="0">
-                <a:schemeClr val="accent1"/>
-              </a:effectRef>
-              <a:fontRef idx="minor">
-                <a:schemeClr val="tx1"/>
-              </a:fontRef>
-            </p:style>
-          </p:cxnSp>
-          <p:cxnSp>
-            <p:nvCxnSpPr>
-              <p:cNvPr id="47" name="Straight Connector 46"/>
-              <p:cNvCxnSpPr>
-                <a:stCxn id="22" idx="0"/>
-              </p:cNvCxnSpPr>
-              <p:nvPr/>
-            </p:nvCxnSpPr>
-            <p:spPr>
-              <a:xfrm flipH="1" flipV="1">
-                <a:off x="4394922" y="21893374"/>
-                <a:ext cx="1" cy="1634574"/>
-              </a:xfrm>
-              <a:prstGeom prst="line">
-                <a:avLst/>
-              </a:prstGeom>
-              <a:ln w="38100"/>
-            </p:spPr>
-            <p:style>
-              <a:lnRef idx="1">
-                <a:schemeClr val="accent1"/>
-              </a:lnRef>
-              <a:fillRef idx="0">
-                <a:schemeClr val="accent1"/>
-              </a:fillRef>
-              <a:effectRef idx="0">
-                <a:schemeClr val="accent1"/>
-              </a:effectRef>
-              <a:fontRef idx="minor">
-                <a:schemeClr val="tx1"/>
-              </a:fontRef>
-            </p:style>
-          </p:cxnSp>
-          <p:cxnSp>
-            <p:nvCxnSpPr>
-              <p:cNvPr id="49" name="Straight Connector 48"/>
-              <p:cNvCxnSpPr/>
-              <p:nvPr/>
-            </p:nvCxnSpPr>
-            <p:spPr>
-              <a:xfrm flipV="1">
-                <a:off x="6324600" y="21893374"/>
-                <a:ext cx="0" cy="1634574"/>
-              </a:xfrm>
-              <a:prstGeom prst="line">
-                <a:avLst/>
-              </a:prstGeom>
-              <a:ln w="38100"/>
-            </p:spPr>
-            <p:style>
-              <a:lnRef idx="1">
-                <a:schemeClr val="accent1"/>
-              </a:lnRef>
-              <a:fillRef idx="0">
-                <a:schemeClr val="accent1"/>
-              </a:fillRef>
-              <a:effectRef idx="0">
-                <a:schemeClr val="accent1"/>
-              </a:effectRef>
-              <a:fontRef idx="minor">
-                <a:schemeClr val="tx1"/>
-              </a:fontRef>
-            </p:style>
-          </p:cxnSp>
-          <p:cxnSp>
-            <p:nvCxnSpPr>
-              <p:cNvPr id="52" name="Elbow Connector 51"/>
-              <p:cNvCxnSpPr>
-                <a:stCxn id="26" idx="0"/>
-                <a:endCxn id="20" idx="3"/>
-              </p:cNvCxnSpPr>
-              <p:nvPr/>
-            </p:nvCxnSpPr>
-            <p:spPr>
-              <a:xfrm rot="16200000" flipV="1">
-                <a:off x="11499311" y="19746635"/>
-                <a:ext cx="1513701" cy="6048926"/>
-              </a:xfrm>
-              <a:prstGeom prst="bentConnector2">
-                <a:avLst/>
-              </a:prstGeom>
-              <a:ln w="38100">
-                <a:tailEnd type="arrow"/>
-              </a:ln>
-            </p:spPr>
-            <p:style>
-              <a:lnRef idx="1">
-                <a:schemeClr val="accent1"/>
-              </a:lnRef>
-              <a:fillRef idx="0">
-                <a:schemeClr val="accent1"/>
-              </a:fillRef>
-              <a:effectRef idx="0">
-                <a:schemeClr val="accent1"/>
-              </a:effectRef>
-              <a:fontRef idx="minor">
-                <a:schemeClr val="tx1"/>
-              </a:fontRef>
-            </p:style>
-          </p:cxnSp>
-          <p:cxnSp>
-            <p:nvCxnSpPr>
-              <p:cNvPr id="54" name="Straight Connector 53"/>
-              <p:cNvCxnSpPr>
-                <a:stCxn id="25" idx="0"/>
-              </p:cNvCxnSpPr>
-              <p:nvPr/>
-            </p:nvCxnSpPr>
-            <p:spPr>
-              <a:xfrm flipV="1">
-                <a:off x="12537424" y="21893374"/>
-                <a:ext cx="0" cy="1634574"/>
-              </a:xfrm>
-              <a:prstGeom prst="line">
-                <a:avLst/>
-              </a:prstGeom>
-              <a:ln w="38100"/>
-            </p:spPr>
-            <p:style>
-              <a:lnRef idx="1">
-                <a:schemeClr val="accent1"/>
-              </a:lnRef>
-              <a:fillRef idx="0">
-                <a:schemeClr val="accent1"/>
-              </a:fillRef>
-              <a:effectRef idx="0">
-                <a:schemeClr val="accent1"/>
-              </a:effectRef>
-              <a:fontRef idx="minor">
-                <a:schemeClr val="tx1"/>
-              </a:fontRef>
-            </p:style>
-          </p:cxnSp>
-          <p:cxnSp>
-            <p:nvCxnSpPr>
-              <p:cNvPr id="55" name="Straight Connector 54"/>
-              <p:cNvCxnSpPr/>
-              <p:nvPr/>
-            </p:nvCxnSpPr>
-            <p:spPr>
-              <a:xfrm flipV="1">
-                <a:off x="10439400" y="21869400"/>
-                <a:ext cx="0" cy="1634574"/>
-              </a:xfrm>
-              <a:prstGeom prst="line">
-                <a:avLst/>
-              </a:prstGeom>
-              <a:ln w="38100"/>
-            </p:spPr>
-            <p:style>
-              <a:lnRef idx="1">
-                <a:schemeClr val="accent1"/>
-              </a:lnRef>
-              <a:fillRef idx="0">
-                <a:schemeClr val="accent1"/>
-              </a:fillRef>
-              <a:effectRef idx="0">
-                <a:schemeClr val="accent1"/>
-              </a:effectRef>
-              <a:fontRef idx="minor">
-                <a:schemeClr val="tx1"/>
-              </a:fontRef>
-            </p:style>
-          </p:cxnSp>
-          <p:sp>
-            <p:nvSpPr>
-              <p:cNvPr id="56" name="Isosceles Triangle 55"/>
-              <p:cNvSpPr/>
-              <p:nvPr/>
-            </p:nvSpPr>
-            <p:spPr>
-              <a:xfrm rot="5400000">
-                <a:off x="6591300" y="21664774"/>
-                <a:ext cx="381000" cy="457200"/>
-              </a:xfrm>
-              <a:prstGeom prst="triangle">
-                <a:avLst/>
-              </a:prstGeom>
-              <a:solidFill>
-                <a:schemeClr val="bg1"/>
-              </a:solidFill>
-            </p:spPr>
-            <p:style>
-              <a:lnRef idx="2">
-                <a:schemeClr val="accent1">
-                  <a:shade val="50000"/>
-                </a:schemeClr>
-              </a:lnRef>
-              <a:fillRef idx="1">
-                <a:schemeClr val="accent1"/>
-              </a:fillRef>
-              <a:effectRef idx="0">
-                <a:schemeClr val="accent1"/>
-              </a:effectRef>
-              <a:fontRef idx="minor">
-                <a:schemeClr val="lt1"/>
-              </a:fontRef>
-            </p:style>
-            <p:txBody>
-              <a:bodyPr rtlCol="0" anchor="ctr"/>
-              <a:lstStyle/>
-              <a:p>
-                <a:pPr algn="ctr"/>
-                <a:endParaRPr lang="en-US"/>
-              </a:p>
-            </p:txBody>
-          </p:sp>
-          <p:sp>
-            <p:nvSpPr>
-              <p:cNvPr id="57" name="Isosceles Triangle 56"/>
-              <p:cNvSpPr/>
-              <p:nvPr/>
-            </p:nvSpPr>
-            <p:spPr>
-              <a:xfrm rot="16200000" flipH="1">
-                <a:off x="9715500" y="21678900"/>
-                <a:ext cx="381000" cy="457200"/>
-              </a:xfrm>
-              <a:prstGeom prst="triangle">
-                <a:avLst/>
-              </a:prstGeom>
-              <a:solidFill>
-                <a:schemeClr val="bg1"/>
-              </a:solidFill>
-            </p:spPr>
-            <p:style>
-              <a:lnRef idx="2">
-                <a:schemeClr val="accent1">
-                  <a:shade val="50000"/>
-                </a:schemeClr>
-              </a:lnRef>
-              <a:fillRef idx="1">
-                <a:schemeClr val="accent1"/>
-              </a:fillRef>
-              <a:effectRef idx="0">
-                <a:schemeClr val="accent1"/>
-              </a:effectRef>
-              <a:fontRef idx="minor">
-                <a:schemeClr val="lt1"/>
-              </a:fontRef>
-            </p:style>
-            <p:txBody>
-              <a:bodyPr rtlCol="0" anchor="ctr"/>
-              <a:lstStyle/>
-              <a:p>
-                <a:pPr algn="ctr"/>
-                <a:endParaRPr lang="en-US"/>
-              </a:p>
-            </p:txBody>
-          </p:sp>
-        </p:grpSp>
-        <p:grpSp>
-          <p:nvGrpSpPr>
-            <p:cNvPr id="95" name="Group 94"/>
-            <p:cNvGrpSpPr/>
-            <p:nvPr/>
-          </p:nvGrpSpPr>
-          <p:grpSpPr>
-            <a:xfrm>
-              <a:off x="266702" y="25146000"/>
-              <a:ext cx="16268698" cy="3048000"/>
-              <a:chOff x="266702" y="25146000"/>
-              <a:chExt cx="16268698" cy="3048000"/>
-            </a:xfrm>
-          </p:grpSpPr>
-          <p:sp>
-            <p:nvSpPr>
-              <p:cNvPr id="60" name="Rounded Rectangle 59"/>
-              <p:cNvSpPr/>
-              <p:nvPr/>
-            </p:nvSpPr>
-            <p:spPr>
-              <a:xfrm>
-                <a:off x="6969377" y="25146000"/>
-                <a:ext cx="2725893" cy="1211508"/>
-              </a:xfrm>
-              <a:prstGeom prst="roundRect">
-                <a:avLst/>
-              </a:prstGeom>
-            </p:spPr>
-            <p:style>
-              <a:lnRef idx="1">
-                <a:schemeClr val="accent5"/>
-              </a:lnRef>
-              <a:fillRef idx="2">
-                <a:schemeClr val="accent5"/>
-              </a:fillRef>
-              <a:effectRef idx="1">
-                <a:schemeClr val="accent5"/>
-              </a:effectRef>
-              <a:fontRef idx="minor">
-                <a:schemeClr val="dk1"/>
-              </a:fontRef>
-            </p:style>
-            <p:txBody>
-              <a:bodyPr lIns="522481" tIns="261241" rIns="522481" bIns="261241" spcCol="0" rtlCol="0" anchor="ctr"/>
-              <a:lstStyle/>
-              <a:p>
-                <a:pPr algn="ctr"/>
-                <a:r>
-                  <a:rPr lang="en-US" sz="2800" dirty="0" smtClean="0"/>
-                  <a:t>Operation</a:t>
-                </a:r>
-                <a:endParaRPr lang="en-US" sz="2800" dirty="0"/>
-              </a:p>
-            </p:txBody>
-          </p:sp>
-          <p:sp>
-            <p:nvSpPr>
-              <p:cNvPr id="61" name="Rounded Rectangle 60"/>
-              <p:cNvSpPr/>
-              <p:nvPr/>
-            </p:nvSpPr>
-            <p:spPr>
-              <a:xfrm>
-                <a:off x="266702" y="27386328"/>
-                <a:ext cx="2322057" cy="807672"/>
-              </a:xfrm>
-              <a:prstGeom prst="roundRect">
-                <a:avLst/>
-              </a:prstGeom>
-            </p:spPr>
-            <p:style>
-              <a:lnRef idx="1">
-                <a:schemeClr val="accent5"/>
-              </a:lnRef>
-              <a:fillRef idx="2">
-                <a:schemeClr val="accent5"/>
-              </a:fillRef>
-              <a:effectRef idx="1">
-                <a:schemeClr val="accent5"/>
-              </a:effectRef>
-              <a:fontRef idx="minor">
-                <a:schemeClr val="dk1"/>
-              </a:fontRef>
-            </p:style>
-            <p:txBody>
-              <a:bodyPr lIns="522481" tIns="261241" rIns="522481" bIns="261241" spcCol="0" rtlCol="0" anchor="ctr"/>
-              <a:lstStyle/>
-              <a:p>
-                <a:pPr algn="ctr"/>
-                <a:r>
-                  <a:rPr lang="en-US" sz="2000" dirty="0" err="1" smtClean="0"/>
-                  <a:t>OperationModify</a:t>
-                </a:r>
-                <a:endParaRPr lang="en-US" sz="2000" dirty="0"/>
-              </a:p>
-            </p:txBody>
-          </p:sp>
-          <p:sp>
-            <p:nvSpPr>
-              <p:cNvPr id="62" name="Rounded Rectangle 61"/>
-              <p:cNvSpPr/>
-              <p:nvPr/>
-            </p:nvSpPr>
-            <p:spPr>
-              <a:xfrm>
-                <a:off x="2781302" y="27386328"/>
-                <a:ext cx="2927811" cy="807672"/>
-              </a:xfrm>
-              <a:prstGeom prst="roundRect">
-                <a:avLst/>
-              </a:prstGeom>
-            </p:spPr>
-            <p:style>
-              <a:lnRef idx="1">
-                <a:schemeClr val="accent5"/>
-              </a:lnRef>
-              <a:fillRef idx="2">
-                <a:schemeClr val="accent5"/>
-              </a:fillRef>
-              <a:effectRef idx="1">
-                <a:schemeClr val="accent5"/>
-              </a:effectRef>
-              <a:fontRef idx="minor">
-                <a:schemeClr val="dk1"/>
-              </a:fontRef>
-            </p:style>
-            <p:txBody>
-              <a:bodyPr lIns="522481" tIns="261241" rIns="522481" bIns="261241" spcCol="0" rtlCol="0" anchor="ctr"/>
-              <a:lstStyle/>
-              <a:p>
-                <a:pPr algn="ctr"/>
-                <a:r>
-                  <a:rPr lang="en-US" sz="2000" dirty="0" err="1" smtClean="0"/>
-                  <a:t>OperationUndo</a:t>
-                </a:r>
-                <a:endParaRPr lang="en-US" sz="2000" dirty="0"/>
-              </a:p>
-            </p:txBody>
-          </p:sp>
-          <p:sp>
-            <p:nvSpPr>
-              <p:cNvPr id="63" name="Rounded Rectangle 62"/>
-              <p:cNvSpPr/>
-              <p:nvPr/>
-            </p:nvSpPr>
-            <p:spPr>
-              <a:xfrm>
-                <a:off x="5959787" y="27386328"/>
-                <a:ext cx="2221098" cy="807672"/>
-              </a:xfrm>
-              <a:prstGeom prst="roundRect">
-                <a:avLst/>
-              </a:prstGeom>
-            </p:spPr>
-            <p:style>
-              <a:lnRef idx="1">
-                <a:schemeClr val="accent5"/>
-              </a:lnRef>
-              <a:fillRef idx="2">
-                <a:schemeClr val="accent5"/>
-              </a:fillRef>
-              <a:effectRef idx="1">
-                <a:schemeClr val="accent5"/>
-              </a:effectRef>
-              <a:fontRef idx="minor">
-                <a:schemeClr val="dk1"/>
-              </a:fontRef>
-            </p:style>
-            <p:txBody>
-              <a:bodyPr lIns="522481" tIns="261241" rIns="522481" bIns="261241" spcCol="0" rtlCol="0" anchor="ctr"/>
-              <a:lstStyle/>
-              <a:p>
-                <a:pPr algn="ctr"/>
-                <a:r>
-                  <a:rPr lang="en-US" sz="2000" dirty="0" err="1" smtClean="0"/>
-                  <a:t>OperationAdd</a:t>
-                </a:r>
-                <a:endParaRPr lang="en-US" sz="2000" dirty="0"/>
-              </a:p>
-            </p:txBody>
-          </p:sp>
-          <p:sp>
-            <p:nvSpPr>
-              <p:cNvPr id="64" name="Rounded Rectangle 63"/>
-              <p:cNvSpPr/>
-              <p:nvPr/>
-            </p:nvSpPr>
-            <p:spPr>
-              <a:xfrm>
-                <a:off x="8267702" y="27386328"/>
-                <a:ext cx="2899845" cy="807672"/>
-              </a:xfrm>
-              <a:prstGeom prst="roundRect">
-                <a:avLst/>
-              </a:prstGeom>
-            </p:spPr>
-            <p:style>
-              <a:lnRef idx="1">
-                <a:schemeClr val="accent5"/>
-              </a:lnRef>
-              <a:fillRef idx="2">
-                <a:schemeClr val="accent5"/>
-              </a:fillRef>
-              <a:effectRef idx="1">
-                <a:schemeClr val="accent5"/>
-              </a:effectRef>
-              <a:fontRef idx="minor">
-                <a:schemeClr val="dk1"/>
-              </a:fontRef>
-            </p:style>
-            <p:txBody>
-              <a:bodyPr lIns="522481" tIns="261241" rIns="522481" bIns="261241" spcCol="0" rtlCol="0" anchor="ctr"/>
-              <a:lstStyle/>
-              <a:p>
-                <a:pPr algn="ctr"/>
-                <a:r>
-                  <a:rPr lang="en-US" sz="2000" dirty="0" err="1" smtClean="0"/>
-                  <a:t>OperationDelete</a:t>
-                </a:r>
-                <a:endParaRPr lang="en-US" sz="2000" dirty="0"/>
-              </a:p>
-            </p:txBody>
-          </p:sp>
-          <p:sp>
-            <p:nvSpPr>
-              <p:cNvPr id="65" name="Rounded Rectangle 64"/>
-              <p:cNvSpPr/>
-              <p:nvPr/>
-            </p:nvSpPr>
-            <p:spPr>
-              <a:xfrm>
-                <a:off x="11282648" y="27386328"/>
-                <a:ext cx="2509552" cy="807672"/>
-              </a:xfrm>
-              <a:prstGeom prst="roundRect">
-                <a:avLst/>
-              </a:prstGeom>
-            </p:spPr>
-            <p:style>
-              <a:lnRef idx="1">
-                <a:schemeClr val="accent5"/>
-              </a:lnRef>
-              <a:fillRef idx="2">
-                <a:schemeClr val="accent5"/>
-              </a:fillRef>
-              <a:effectRef idx="1">
-                <a:schemeClr val="accent5"/>
-              </a:effectRef>
-              <a:fontRef idx="minor">
-                <a:schemeClr val="dk1"/>
-              </a:fontRef>
-            </p:style>
-            <p:txBody>
-              <a:bodyPr lIns="522481" tIns="261241" rIns="522481" bIns="261241" spcCol="0" rtlCol="0" anchor="ctr"/>
-              <a:lstStyle/>
-              <a:p>
-                <a:pPr algn="ctr"/>
-                <a:r>
-                  <a:rPr lang="en-US" sz="2000" dirty="0" err="1" smtClean="0"/>
-                  <a:t>OperationDisplay</a:t>
-                </a:r>
-                <a:endParaRPr lang="en-US" sz="2000" dirty="0"/>
-              </a:p>
-            </p:txBody>
-          </p:sp>
-          <p:sp>
-            <p:nvSpPr>
-              <p:cNvPr id="66" name="Rounded Rectangle 65"/>
-              <p:cNvSpPr/>
-              <p:nvPr/>
-            </p:nvSpPr>
-            <p:spPr>
-              <a:xfrm>
-                <a:off x="14025848" y="27386328"/>
-                <a:ext cx="2509552" cy="807672"/>
-              </a:xfrm>
-              <a:prstGeom prst="roundRect">
-                <a:avLst/>
-              </a:prstGeom>
-            </p:spPr>
-            <p:style>
-              <a:lnRef idx="1">
-                <a:schemeClr val="accent5"/>
-              </a:lnRef>
-              <a:fillRef idx="2">
-                <a:schemeClr val="accent5"/>
-              </a:fillRef>
-              <a:effectRef idx="1">
-                <a:schemeClr val="accent5"/>
-              </a:effectRef>
-              <a:fontRef idx="minor">
-                <a:schemeClr val="dk1"/>
-              </a:fontRef>
-            </p:style>
-            <p:txBody>
-              <a:bodyPr lIns="522481" tIns="261241" rIns="522481" bIns="261241" spcCol="0" rtlCol="0" anchor="ctr"/>
-              <a:lstStyle/>
-              <a:p>
-                <a:pPr algn="ctr"/>
-                <a:r>
-                  <a:rPr lang="en-US" sz="2000" dirty="0" err="1" smtClean="0"/>
-                  <a:t>OperationSearch</a:t>
-                </a:r>
-                <a:endParaRPr lang="en-US" sz="2000" dirty="0"/>
-              </a:p>
-            </p:txBody>
-          </p:sp>
-          <p:cxnSp>
-            <p:nvCxnSpPr>
-              <p:cNvPr id="67" name="Elbow Connector 66"/>
-              <p:cNvCxnSpPr>
-                <a:stCxn id="61" idx="0"/>
-                <a:endCxn id="60" idx="1"/>
-              </p:cNvCxnSpPr>
-              <p:nvPr/>
-            </p:nvCxnSpPr>
-            <p:spPr>
-              <a:xfrm rot="5400000" flipH="1" flipV="1">
-                <a:off x="3381267" y="23798218"/>
-                <a:ext cx="1634574" cy="5541646"/>
-              </a:xfrm>
-              <a:prstGeom prst="bentConnector2">
-                <a:avLst/>
-              </a:prstGeom>
-              <a:ln w="38100">
-                <a:tailEnd type="arrow"/>
-              </a:ln>
-            </p:spPr>
-            <p:style>
-              <a:lnRef idx="1">
-                <a:schemeClr val="accent1"/>
-              </a:lnRef>
-              <a:fillRef idx="0">
-                <a:schemeClr val="accent1"/>
-              </a:fillRef>
-              <a:effectRef idx="0">
-                <a:schemeClr val="accent1"/>
-              </a:effectRef>
-              <a:fontRef idx="minor">
-                <a:schemeClr val="tx1"/>
-              </a:fontRef>
-            </p:style>
-          </p:cxnSp>
-          <p:cxnSp>
-            <p:nvCxnSpPr>
-              <p:cNvPr id="68" name="Straight Connector 67"/>
-              <p:cNvCxnSpPr/>
-              <p:nvPr/>
-            </p:nvCxnSpPr>
-            <p:spPr>
-              <a:xfrm flipV="1">
-                <a:off x="4245208" y="25755600"/>
-                <a:ext cx="0" cy="1592628"/>
-              </a:xfrm>
-              <a:prstGeom prst="line">
-                <a:avLst/>
-              </a:prstGeom>
-              <a:ln w="38100"/>
-            </p:spPr>
-            <p:style>
-              <a:lnRef idx="1">
-                <a:schemeClr val="accent1"/>
-              </a:lnRef>
-              <a:fillRef idx="0">
-                <a:schemeClr val="accent1"/>
-              </a:fillRef>
-              <a:effectRef idx="0">
-                <a:schemeClr val="accent1"/>
-              </a:effectRef>
-              <a:fontRef idx="minor">
-                <a:schemeClr val="tx1"/>
-              </a:fontRef>
-            </p:style>
-          </p:cxnSp>
-          <p:cxnSp>
-            <p:nvCxnSpPr>
-              <p:cNvPr id="69" name="Straight Connector 68"/>
-              <p:cNvCxnSpPr/>
-              <p:nvPr/>
-            </p:nvCxnSpPr>
-            <p:spPr>
-              <a:xfrm flipV="1">
-                <a:off x="6324600" y="25751754"/>
-                <a:ext cx="0" cy="1634574"/>
-              </a:xfrm>
-              <a:prstGeom prst="line">
-                <a:avLst/>
-              </a:prstGeom>
-              <a:ln w="38100"/>
-            </p:spPr>
-            <p:style>
-              <a:lnRef idx="1">
-                <a:schemeClr val="accent1"/>
-              </a:lnRef>
-              <a:fillRef idx="0">
-                <a:schemeClr val="accent1"/>
-              </a:fillRef>
-              <a:effectRef idx="0">
-                <a:schemeClr val="accent1"/>
-              </a:effectRef>
-              <a:fontRef idx="minor">
-                <a:schemeClr val="tx1"/>
-              </a:fontRef>
-            </p:style>
-          </p:cxnSp>
-          <p:cxnSp>
-            <p:nvCxnSpPr>
-              <p:cNvPr id="70" name="Elbow Connector 69"/>
-              <p:cNvCxnSpPr>
-                <a:stCxn id="66" idx="0"/>
-                <a:endCxn id="60" idx="3"/>
-              </p:cNvCxnSpPr>
-              <p:nvPr/>
-            </p:nvCxnSpPr>
-            <p:spPr>
-              <a:xfrm rot="16200000" flipV="1">
-                <a:off x="11670660" y="23776364"/>
-                <a:ext cx="1634574" cy="5585354"/>
-              </a:xfrm>
-              <a:prstGeom prst="bentConnector2">
-                <a:avLst/>
-              </a:prstGeom>
-              <a:ln w="38100">
-                <a:tailEnd type="arrow"/>
-              </a:ln>
-            </p:spPr>
-            <p:style>
-              <a:lnRef idx="1">
-                <a:schemeClr val="accent1"/>
-              </a:lnRef>
-              <a:fillRef idx="0">
-                <a:schemeClr val="accent1"/>
-              </a:fillRef>
-              <a:effectRef idx="0">
-                <a:schemeClr val="accent1"/>
-              </a:effectRef>
-              <a:fontRef idx="minor">
-                <a:schemeClr val="tx1"/>
-              </a:fontRef>
-            </p:style>
-          </p:cxnSp>
-          <p:cxnSp>
-            <p:nvCxnSpPr>
-              <p:cNvPr id="71" name="Straight Connector 70"/>
-              <p:cNvCxnSpPr>
-                <a:stCxn id="65" idx="0"/>
-              </p:cNvCxnSpPr>
-              <p:nvPr/>
-            </p:nvCxnSpPr>
-            <p:spPr>
-              <a:xfrm flipV="1">
-                <a:off x="12537424" y="25751754"/>
-                <a:ext cx="0" cy="1634574"/>
-              </a:xfrm>
-              <a:prstGeom prst="line">
-                <a:avLst/>
-              </a:prstGeom>
-              <a:ln w="38100"/>
-            </p:spPr>
-            <p:style>
-              <a:lnRef idx="1">
-                <a:schemeClr val="accent1"/>
-              </a:lnRef>
-              <a:fillRef idx="0">
-                <a:schemeClr val="accent1"/>
-              </a:fillRef>
-              <a:effectRef idx="0">
-                <a:schemeClr val="accent1"/>
-              </a:effectRef>
-              <a:fontRef idx="minor">
-                <a:schemeClr val="tx1"/>
-              </a:fontRef>
-            </p:style>
-          </p:cxnSp>
-          <p:cxnSp>
-            <p:nvCxnSpPr>
-              <p:cNvPr id="72" name="Straight Connector 71"/>
-              <p:cNvCxnSpPr/>
-              <p:nvPr/>
-            </p:nvCxnSpPr>
-            <p:spPr>
-              <a:xfrm flipV="1">
-                <a:off x="10439400" y="25727780"/>
-                <a:ext cx="0" cy="1634574"/>
-              </a:xfrm>
-              <a:prstGeom prst="line">
-                <a:avLst/>
-              </a:prstGeom>
-              <a:ln w="38100"/>
-            </p:spPr>
-            <p:style>
-              <a:lnRef idx="1">
-                <a:schemeClr val="accent1"/>
-              </a:lnRef>
-              <a:fillRef idx="0">
-                <a:schemeClr val="accent1"/>
-              </a:fillRef>
-              <a:effectRef idx="0">
-                <a:schemeClr val="accent1"/>
-              </a:effectRef>
-              <a:fontRef idx="minor">
-                <a:schemeClr val="tx1"/>
-              </a:fontRef>
-            </p:style>
-          </p:cxnSp>
-          <p:sp>
-            <p:nvSpPr>
-              <p:cNvPr id="73" name="Isosceles Triangle 72"/>
-              <p:cNvSpPr/>
-              <p:nvPr/>
-            </p:nvSpPr>
-            <p:spPr>
-              <a:xfrm rot="5400000">
-                <a:off x="6591300" y="25523154"/>
-                <a:ext cx="381000" cy="457200"/>
-              </a:xfrm>
-              <a:prstGeom prst="triangle">
-                <a:avLst/>
-              </a:prstGeom>
-              <a:solidFill>
-                <a:schemeClr val="bg1"/>
-              </a:solidFill>
-            </p:spPr>
-            <p:style>
-              <a:lnRef idx="2">
-                <a:schemeClr val="accent1">
-                  <a:shade val="50000"/>
-                </a:schemeClr>
-              </a:lnRef>
-              <a:fillRef idx="1">
-                <a:schemeClr val="accent1"/>
-              </a:fillRef>
-              <a:effectRef idx="0">
-                <a:schemeClr val="accent1"/>
-              </a:effectRef>
-              <a:fontRef idx="minor">
-                <a:schemeClr val="lt1"/>
-              </a:fontRef>
-            </p:style>
-            <p:txBody>
-              <a:bodyPr rtlCol="0" anchor="ctr"/>
-              <a:lstStyle/>
-              <a:p>
-                <a:pPr algn="ctr"/>
-                <a:endParaRPr lang="en-US"/>
-              </a:p>
-            </p:txBody>
-          </p:sp>
-          <p:sp>
-            <p:nvSpPr>
-              <p:cNvPr id="74" name="Isosceles Triangle 73"/>
-              <p:cNvSpPr/>
-              <p:nvPr/>
-            </p:nvSpPr>
-            <p:spPr>
-              <a:xfrm rot="16200000" flipH="1">
-                <a:off x="9715500" y="25537280"/>
-                <a:ext cx="381000" cy="457200"/>
-              </a:xfrm>
-              <a:prstGeom prst="triangle">
-                <a:avLst/>
-              </a:prstGeom>
-              <a:solidFill>
-                <a:schemeClr val="bg1"/>
-              </a:solidFill>
-            </p:spPr>
-            <p:style>
-              <a:lnRef idx="2">
-                <a:schemeClr val="accent1">
-                  <a:shade val="50000"/>
-                </a:schemeClr>
-              </a:lnRef>
-              <a:fillRef idx="1">
-                <a:schemeClr val="accent1"/>
-              </a:fillRef>
-              <a:effectRef idx="0">
-                <a:schemeClr val="accent1"/>
-              </a:effectRef>
-              <a:fontRef idx="minor">
-                <a:schemeClr val="lt1"/>
-              </a:fontRef>
-            </p:style>
-            <p:txBody>
-              <a:bodyPr rtlCol="0" anchor="ctr"/>
-              <a:lstStyle/>
-              <a:p>
-                <a:pPr algn="ctr"/>
-                <a:endParaRPr lang="en-US"/>
-              </a:p>
-            </p:txBody>
-          </p:sp>
-        </p:grpSp>
-      </p:grpSp>
       <p:cxnSp>
         <p:nvCxnSpPr>
           <p:cNvPr id="79" name="Straight Arrow Connector 78"/>
@@ -6628,7 +5425,7 @@
         </p:nvSpPr>
         <p:spPr>
           <a:xfrm>
-            <a:off x="12344400" y="13700501"/>
+            <a:off x="12382499" y="13700501"/>
             <a:ext cx="1485901" cy="369332"/>
           </a:xfrm>
           <a:prstGeom prst="rect">

</xml_diff>